<commit_message>
Slide over SDN mogelijkheden
</commit_message>
<xml_diff>
--- a/Workshop Presentatie.pptx
+++ b/Workshop Presentatie.pptx
@@ -6,7 +6,7 @@
     <p:sldMasterId id="2147483700" r:id="rId2"/>
   </p:sldMasterIdLst>
   <p:notesMasterIdLst>
-    <p:notesMasterId r:id="rId21"/>
+    <p:notesMasterId r:id="rId22"/>
   </p:notesMasterIdLst>
   <p:sldIdLst>
     <p:sldId id="256" r:id="rId3"/>
@@ -14,69 +14,70 @@
     <p:sldId id="258" r:id="rId5"/>
     <p:sldId id="259" r:id="rId6"/>
     <p:sldId id="260" r:id="rId7"/>
-    <p:sldId id="261" r:id="rId8"/>
-    <p:sldId id="262" r:id="rId9"/>
-    <p:sldId id="263" r:id="rId10"/>
-    <p:sldId id="264" r:id="rId11"/>
-    <p:sldId id="266" r:id="rId12"/>
-    <p:sldId id="267" r:id="rId13"/>
-    <p:sldId id="268" r:id="rId14"/>
-    <p:sldId id="269" r:id="rId15"/>
-    <p:sldId id="265" r:id="rId16"/>
-    <p:sldId id="270" r:id="rId17"/>
-    <p:sldId id="271" r:id="rId18"/>
-    <p:sldId id="272" r:id="rId19"/>
-    <p:sldId id="273" r:id="rId20"/>
+    <p:sldId id="274" r:id="rId8"/>
+    <p:sldId id="261" r:id="rId9"/>
+    <p:sldId id="262" r:id="rId10"/>
+    <p:sldId id="263" r:id="rId11"/>
+    <p:sldId id="264" r:id="rId12"/>
+    <p:sldId id="266" r:id="rId13"/>
+    <p:sldId id="267" r:id="rId14"/>
+    <p:sldId id="268" r:id="rId15"/>
+    <p:sldId id="269" r:id="rId16"/>
+    <p:sldId id="265" r:id="rId17"/>
+    <p:sldId id="270" r:id="rId18"/>
+    <p:sldId id="271" r:id="rId19"/>
+    <p:sldId id="272" r:id="rId20"/>
+    <p:sldId id="273" r:id="rId21"/>
   </p:sldIdLst>
   <p:sldSz cx="9144000" cy="5143500" type="screen16x9"/>
   <p:notesSz cx="6858000" cy="9144000"/>
   <p:embeddedFontLst>
     <p:embeddedFont>
-      <p:font typeface="Source Sans Pro"/>
-      <p:regular r:id="rId22"/>
-      <p:bold r:id="rId23"/>
+      <p:font typeface="KPN Sans Light" panose="020B0604020202020204" charset="0"/>
+      <p:regular r:id="rId23"/>
       <p:italic r:id="rId24"/>
-      <p:boldItalic r:id="rId25"/>
     </p:embeddedFont>
     <p:embeddedFont>
-      <p:font typeface="Roboto Slab"/>
-      <p:regular r:id="rId26"/>
-      <p:bold r:id="rId27"/>
+      <p:font typeface="KPN Accent" panose="020B0604020202020204" charset="0"/>
+      <p:regular r:id="rId25"/>
+      <p:bold r:id="rId26"/>
     </p:embeddedFont>
     <p:embeddedFont>
       <p:font typeface="Kokila" panose="020B0604020202020204" pitchFamily="34" charset="0"/>
-      <p:regular r:id="rId28"/>
-      <p:bold r:id="rId29"/>
-      <p:italic r:id="rId30"/>
-      <p:boldItalic r:id="rId31"/>
+      <p:regular r:id="rId27"/>
+      <p:bold r:id="rId28"/>
+      <p:italic r:id="rId29"/>
+      <p:boldItalic r:id="rId30"/>
     </p:embeddedFont>
     <p:embeddedFont>
-      <p:font typeface="KPN Sans" panose="020B0503040101020103" pitchFamily="34" charset="0"/>
+      <p:font typeface="KPN Accent Light" panose="020B0604020202020204" charset="0"/>
+      <p:regular r:id="rId31"/>
+    </p:embeddedFont>
+    <p:embeddedFont>
+      <p:font typeface="Source Sans Pro" panose="020B0604020202020204" charset="0"/>
       <p:regular r:id="rId32"/>
       <p:bold r:id="rId33"/>
       <p:italic r:id="rId34"/>
       <p:boldItalic r:id="rId35"/>
     </p:embeddedFont>
     <p:embeddedFont>
-      <p:font typeface="KPN Sans Light" panose="020B0604020202020204" charset="0"/>
+      <p:font typeface="Calibri" panose="020F0502020204030204" pitchFamily="34" charset="0"/>
       <p:regular r:id="rId36"/>
-      <p:italic r:id="rId37"/>
+      <p:bold r:id="rId37"/>
+      <p:italic r:id="rId38"/>
+      <p:boldItalic r:id="rId39"/>
     </p:embeddedFont>
     <p:embeddedFont>
-      <p:font typeface="KPN Accent" panose="020B0604020202020204" charset="0"/>
-      <p:regular r:id="rId38"/>
-      <p:bold r:id="rId39"/>
+      <p:font typeface="KPN Sans" panose="020B0503040101020103" pitchFamily="34" charset="0"/>
+      <p:regular r:id="rId40"/>
+      <p:bold r:id="rId41"/>
+      <p:italic r:id="rId42"/>
+      <p:boldItalic r:id="rId43"/>
     </p:embeddedFont>
     <p:embeddedFont>
-      <p:font typeface="KPN Accent Light" panose="020B0604020202020204" charset="0"/>
-      <p:regular r:id="rId40"/>
-    </p:embeddedFont>
-    <p:embeddedFont>
-      <p:font typeface="Calibri" panose="020F0502020204030204" pitchFamily="34" charset="0"/>
-      <p:regular r:id="rId41"/>
-      <p:bold r:id="rId42"/>
-      <p:italic r:id="rId43"/>
-      <p:boldItalic r:id="rId44"/>
+      <p:font typeface="Roboto Slab" panose="020B0604020202020204" charset="0"/>
+      <p:regular r:id="rId44"/>
+      <p:bold r:id="rId45"/>
     </p:embeddedFont>
   </p:embeddedFontLst>
   <p:defaultTextStyle>
@@ -284,6 +285,10 @@
     </p:extLst>
   </p:cmAuthor>
 </p:cmAuthorLst>
+</file>
+
+<file path=ppt/revisionInfo.xml><?xml version="1.0" encoding="utf-8"?>
+<p1510:revInfo xmlns:a="http://schemas.openxmlformats.org/drawingml/2006/main" xmlns:r="http://schemas.openxmlformats.org/officeDocument/2006/relationships" xmlns:p1510="http://schemas.microsoft.com/office/powerpoint/2015/10/main"/>
 </file>
 
 <file path=ppt/notesMasters/notesMaster1.xml><?xml version="1.0" encoding="utf-8"?>
@@ -12351,7 +12356,7 @@
           <a:p>
             <a:r>
               <a:rPr lang="nl-NL" dirty="0"/>
-              <a:t>Communicatie in een traditioneel netwerk (3)</a:t>
+              <a:t>Communicatie in een traditioneel netwerk (2)</a:t>
             </a:r>
           </a:p>
         </p:txBody>
@@ -12415,6 +12420,625 @@
               <a:rPr lang="en-GB" smtClean="0"/>
               <a:pPr/>
               <a:t>10</a:t>
+            </a:fld>
+            <a:endParaRPr lang="en-GB" dirty="0"/>
+          </a:p>
+        </p:txBody>
+      </p:sp>
+      <p:sp>
+        <p:nvSpPr>
+          <p:cNvPr id="7" name="Footer Placeholder 6">
+            <a:extLst>
+              <a:ext uri="{FF2B5EF4-FFF2-40B4-BE49-F238E27FC236}">
+                <a16:creationId xmlns:a16="http://schemas.microsoft.com/office/drawing/2014/main" id="{8CF9EF63-6D3A-45DC-9183-B93FC38D31C4}"/>
+              </a:ext>
+            </a:extLst>
+          </p:cNvPr>
+          <p:cNvSpPr>
+            <a:spLocks noGrp="1"/>
+          </p:cNvSpPr>
+          <p:nvPr>
+            <p:ph type="ftr" sz="quarter" idx="3"/>
+          </p:nvPr>
+        </p:nvSpPr>
+        <p:spPr/>
+        <p:txBody>
+          <a:bodyPr/>
+          <a:lstStyle/>
+          <a:p>
+            <a:r>
+              <a:rPr lang="nl-NL"/>
+              <a:t>Marlou Pors</a:t>
+            </a:r>
+            <a:endParaRPr lang="nl-NL" dirty="0"/>
+          </a:p>
+        </p:txBody>
+      </p:sp>
+      <p:pic>
+        <p:nvPicPr>
+          <p:cNvPr id="8" name="Picture 7">
+            <a:extLst>
+              <a:ext uri="{FF2B5EF4-FFF2-40B4-BE49-F238E27FC236}">
+                <a16:creationId xmlns:a16="http://schemas.microsoft.com/office/drawing/2014/main" id="{9E0F9F15-5290-4956-9659-719F9C878877}"/>
+              </a:ext>
+            </a:extLst>
+          </p:cNvPr>
+          <p:cNvPicPr>
+            <a:picLocks noChangeAspect="1"/>
+          </p:cNvPicPr>
+          <p:nvPr/>
+        </p:nvPicPr>
+        <p:blipFill>
+          <a:blip r:embed="rId2"/>
+          <a:stretch>
+            <a:fillRect/>
+          </a:stretch>
+        </p:blipFill>
+        <p:spPr>
+          <a:xfrm>
+            <a:off x="1827379" y="1920130"/>
+            <a:ext cx="5563082" cy="2522439"/>
+          </a:xfrm>
+          <a:prstGeom prst="rect">
+            <a:avLst/>
+          </a:prstGeom>
+        </p:spPr>
+      </p:pic>
+      <p:sp>
+        <p:nvSpPr>
+          <p:cNvPr id="19" name="Toelichting met afgeronde rechthoek 5">
+            <a:extLst>
+              <a:ext uri="{FF2B5EF4-FFF2-40B4-BE49-F238E27FC236}">
+                <a16:creationId xmlns:a16="http://schemas.microsoft.com/office/drawing/2014/main" id="{4361040E-2DFE-4318-9389-CB83C5C5449A}"/>
+              </a:ext>
+            </a:extLst>
+          </p:cNvPr>
+          <p:cNvSpPr/>
+          <p:nvPr/>
+        </p:nvSpPr>
+        <p:spPr>
+          <a:xfrm>
+            <a:off x="1827379" y="1505880"/>
+            <a:ext cx="1423554" cy="827126"/>
+          </a:xfrm>
+          <a:prstGeom prst="wedgeRoundRectCallout">
+            <a:avLst/>
+          </a:prstGeom>
+          <a:noFill/>
+        </p:spPr>
+        <p:style>
+          <a:lnRef idx="1">
+            <a:schemeClr val="accent1"/>
+          </a:lnRef>
+          <a:fillRef idx="3">
+            <a:schemeClr val="accent1"/>
+          </a:fillRef>
+          <a:effectRef idx="2">
+            <a:schemeClr val="accent1"/>
+          </a:effectRef>
+          <a:fontRef idx="minor">
+            <a:schemeClr val="lt1"/>
+          </a:fontRef>
+        </p:style>
+        <p:txBody>
+          <a:bodyPr rtlCol="0" anchor="ctr"/>
+          <a:lstStyle/>
+          <a:p>
+            <a:pPr algn="ctr"/>
+            <a:endParaRPr lang="nl-NL"/>
+          </a:p>
+        </p:txBody>
+      </p:sp>
+      <p:sp>
+        <p:nvSpPr>
+          <p:cNvPr id="20" name="Tekstvak 6">
+            <a:extLst>
+              <a:ext uri="{FF2B5EF4-FFF2-40B4-BE49-F238E27FC236}">
+                <a16:creationId xmlns:a16="http://schemas.microsoft.com/office/drawing/2014/main" id="{B19EE041-67B9-48B0-865B-A2D2BDE65B88}"/>
+              </a:ext>
+            </a:extLst>
+          </p:cNvPr>
+          <p:cNvSpPr txBox="1"/>
+          <p:nvPr/>
+        </p:nvSpPr>
+        <p:spPr>
+          <a:xfrm>
+            <a:off x="1827379" y="1596277"/>
+            <a:ext cx="1452997" cy="646331"/>
+          </a:xfrm>
+          <a:prstGeom prst="rect">
+            <a:avLst/>
+          </a:prstGeom>
+          <a:noFill/>
+        </p:spPr>
+        <p:txBody>
+          <a:bodyPr wrap="square" rtlCol="0">
+            <a:spAutoFit/>
+          </a:bodyPr>
+          <a:lstStyle/>
+          <a:p>
+            <a:r>
+              <a:rPr lang="nl-NL" dirty="0"/>
+              <a:t>Laten we H2 begroeten! </a:t>
+            </a:r>
+          </a:p>
+        </p:txBody>
+      </p:sp>
+      <p:cxnSp>
+        <p:nvCxnSpPr>
+          <p:cNvPr id="4" name="Straight Arrow Connector 3">
+            <a:extLst>
+              <a:ext uri="{FF2B5EF4-FFF2-40B4-BE49-F238E27FC236}">
+                <a16:creationId xmlns:a16="http://schemas.microsoft.com/office/drawing/2014/main" id="{0293E248-DFF3-4AFE-8F38-BBE60DDE2518}"/>
+              </a:ext>
+            </a:extLst>
+          </p:cNvPr>
+          <p:cNvCxnSpPr/>
+          <p:nvPr/>
+        </p:nvCxnSpPr>
+        <p:spPr>
+          <a:xfrm>
+            <a:off x="2661424" y="2824976"/>
+            <a:ext cx="683942" cy="0"/>
+          </a:xfrm>
+          <a:prstGeom prst="straightConnector1">
+            <a:avLst/>
+          </a:prstGeom>
+          <a:ln w="28575">
+            <a:solidFill>
+              <a:srgbClr val="FF0000"/>
+            </a:solidFill>
+            <a:tailEnd type="triangle"/>
+          </a:ln>
+        </p:spPr>
+        <p:style>
+          <a:lnRef idx="1">
+            <a:schemeClr val="accent1"/>
+          </a:lnRef>
+          <a:fillRef idx="0">
+            <a:schemeClr val="accent1"/>
+          </a:fillRef>
+          <a:effectRef idx="0">
+            <a:schemeClr val="accent1"/>
+          </a:effectRef>
+          <a:fontRef idx="minor">
+            <a:schemeClr val="tx1"/>
+          </a:fontRef>
+        </p:style>
+      </p:cxnSp>
+      <p:cxnSp>
+        <p:nvCxnSpPr>
+          <p:cNvPr id="21" name="Straight Arrow Connector 20">
+            <a:extLst>
+              <a:ext uri="{FF2B5EF4-FFF2-40B4-BE49-F238E27FC236}">
+                <a16:creationId xmlns:a16="http://schemas.microsoft.com/office/drawing/2014/main" id="{B9F94FE1-1085-4C02-904F-7121006B3408}"/>
+              </a:ext>
+            </a:extLst>
+          </p:cNvPr>
+          <p:cNvCxnSpPr/>
+          <p:nvPr/>
+        </p:nvCxnSpPr>
+        <p:spPr>
+          <a:xfrm>
+            <a:off x="4095681" y="2806391"/>
+            <a:ext cx="683942" cy="0"/>
+          </a:xfrm>
+          <a:prstGeom prst="straightConnector1">
+            <a:avLst/>
+          </a:prstGeom>
+          <a:ln w="28575">
+            <a:solidFill>
+              <a:srgbClr val="FF0000"/>
+            </a:solidFill>
+            <a:tailEnd type="triangle"/>
+          </a:ln>
+        </p:spPr>
+        <p:style>
+          <a:lnRef idx="1">
+            <a:schemeClr val="accent1"/>
+          </a:lnRef>
+          <a:fillRef idx="0">
+            <a:schemeClr val="accent1"/>
+          </a:fillRef>
+          <a:effectRef idx="0">
+            <a:schemeClr val="accent1"/>
+          </a:effectRef>
+          <a:fontRef idx="minor">
+            <a:schemeClr val="tx1"/>
+          </a:fontRef>
+        </p:style>
+      </p:cxnSp>
+      <p:cxnSp>
+        <p:nvCxnSpPr>
+          <p:cNvPr id="22" name="Straight Arrow Connector 21">
+            <a:extLst>
+              <a:ext uri="{FF2B5EF4-FFF2-40B4-BE49-F238E27FC236}">
+                <a16:creationId xmlns:a16="http://schemas.microsoft.com/office/drawing/2014/main" id="{51359DAA-5F73-4870-AD3D-11FB7A0F931C}"/>
+              </a:ext>
+            </a:extLst>
+          </p:cNvPr>
+          <p:cNvCxnSpPr/>
+          <p:nvPr/>
+        </p:nvCxnSpPr>
+        <p:spPr>
+          <a:xfrm>
+            <a:off x="5519853" y="2806391"/>
+            <a:ext cx="683942" cy="0"/>
+          </a:xfrm>
+          <a:prstGeom prst="straightConnector1">
+            <a:avLst/>
+          </a:prstGeom>
+          <a:ln w="28575">
+            <a:solidFill>
+              <a:srgbClr val="FF0000"/>
+            </a:solidFill>
+            <a:tailEnd type="triangle"/>
+          </a:ln>
+        </p:spPr>
+        <p:style>
+          <a:lnRef idx="1">
+            <a:schemeClr val="accent1"/>
+          </a:lnRef>
+          <a:fillRef idx="0">
+            <a:schemeClr val="accent1"/>
+          </a:fillRef>
+          <a:effectRef idx="0">
+            <a:schemeClr val="accent1"/>
+          </a:effectRef>
+          <a:fontRef idx="minor">
+            <a:schemeClr val="tx1"/>
+          </a:fontRef>
+        </p:style>
+      </p:cxnSp>
+      <p:cxnSp>
+        <p:nvCxnSpPr>
+          <p:cNvPr id="23" name="Straight Arrow Connector 22">
+            <a:extLst>
+              <a:ext uri="{FF2B5EF4-FFF2-40B4-BE49-F238E27FC236}">
+                <a16:creationId xmlns:a16="http://schemas.microsoft.com/office/drawing/2014/main" id="{A0AEB424-8125-4140-AA43-A9A2F421E4E4}"/>
+              </a:ext>
+            </a:extLst>
+          </p:cNvPr>
+          <p:cNvCxnSpPr>
+            <a:cxnSpLocks/>
+          </p:cNvCxnSpPr>
+          <p:nvPr/>
+        </p:nvCxnSpPr>
+        <p:spPr>
+          <a:xfrm>
+            <a:off x="5252224" y="3044283"/>
+            <a:ext cx="367991" cy="598449"/>
+          </a:xfrm>
+          <a:prstGeom prst="straightConnector1">
+            <a:avLst/>
+          </a:prstGeom>
+          <a:ln w="28575">
+            <a:solidFill>
+              <a:srgbClr val="FF0000"/>
+            </a:solidFill>
+            <a:tailEnd type="triangle"/>
+          </a:ln>
+        </p:spPr>
+        <p:style>
+          <a:lnRef idx="1">
+            <a:schemeClr val="accent1"/>
+          </a:lnRef>
+          <a:fillRef idx="0">
+            <a:schemeClr val="accent1"/>
+          </a:fillRef>
+          <a:effectRef idx="0">
+            <a:schemeClr val="accent1"/>
+          </a:effectRef>
+          <a:fontRef idx="minor">
+            <a:schemeClr val="tx1"/>
+          </a:fontRef>
+        </p:style>
+      </p:cxnSp>
+      <p:sp>
+        <p:nvSpPr>
+          <p:cNvPr id="25" name="Wolkvormige toelichting 14">
+            <a:extLst>
+              <a:ext uri="{FF2B5EF4-FFF2-40B4-BE49-F238E27FC236}">
+                <a16:creationId xmlns:a16="http://schemas.microsoft.com/office/drawing/2014/main" id="{59D8B84F-4A0F-497F-B1BF-B7E7AA38A93F}"/>
+              </a:ext>
+            </a:extLst>
+          </p:cNvPr>
+          <p:cNvSpPr/>
+          <p:nvPr/>
+        </p:nvSpPr>
+        <p:spPr>
+          <a:xfrm rot="765422">
+            <a:off x="4983882" y="937857"/>
+            <a:ext cx="2167417" cy="1316839"/>
+          </a:xfrm>
+          <a:prstGeom prst="cloudCallout">
+            <a:avLst>
+              <a:gd name="adj1" fmla="val -23621"/>
+              <a:gd name="adj2" fmla="val 70820"/>
+            </a:avLst>
+          </a:prstGeom>
+          <a:noFill/>
+          <a:ln w="12700">
+            <a:solidFill>
+              <a:schemeClr val="tx2">
+                <a:lumMod val="60000"/>
+                <a:lumOff val="40000"/>
+              </a:schemeClr>
+            </a:solidFill>
+          </a:ln>
+        </p:spPr>
+        <p:style>
+          <a:lnRef idx="1">
+            <a:schemeClr val="accent1"/>
+          </a:lnRef>
+          <a:fillRef idx="3">
+            <a:schemeClr val="accent1"/>
+          </a:fillRef>
+          <a:effectRef idx="2">
+            <a:schemeClr val="accent1"/>
+          </a:effectRef>
+          <a:fontRef idx="minor">
+            <a:schemeClr val="lt1"/>
+          </a:fontRef>
+        </p:style>
+        <p:txBody>
+          <a:bodyPr rtlCol="0" anchor="ctr"/>
+          <a:lstStyle/>
+          <a:p>
+            <a:pPr algn="ctr"/>
+            <a:endParaRPr lang="nl-NL"/>
+          </a:p>
+        </p:txBody>
+      </p:sp>
+      <p:sp>
+        <p:nvSpPr>
+          <p:cNvPr id="26" name="Tekstvak 15">
+            <a:extLst>
+              <a:ext uri="{FF2B5EF4-FFF2-40B4-BE49-F238E27FC236}">
+                <a16:creationId xmlns:a16="http://schemas.microsoft.com/office/drawing/2014/main" id="{FE8E510A-2615-4053-992A-513E7208287D}"/>
+              </a:ext>
+            </a:extLst>
+          </p:cNvPr>
+          <p:cNvSpPr txBox="1"/>
+          <p:nvPr/>
+        </p:nvSpPr>
+        <p:spPr>
+          <a:xfrm flipH="1">
+            <a:off x="5157913" y="1426999"/>
+            <a:ext cx="2112026" cy="338554"/>
+          </a:xfrm>
+          <a:prstGeom prst="rect">
+            <a:avLst/>
+          </a:prstGeom>
+          <a:noFill/>
+        </p:spPr>
+        <p:txBody>
+          <a:bodyPr wrap="square" rtlCol="0">
+            <a:spAutoFit/>
+          </a:bodyPr>
+          <a:lstStyle/>
+          <a:p>
+            <a:r>
+              <a:rPr lang="nl-NL" sz="1600" dirty="0"/>
+              <a:t>Ik ken H2 ook niet!</a:t>
+            </a:r>
+          </a:p>
+        </p:txBody>
+      </p:sp>
+      <p:sp>
+        <p:nvSpPr>
+          <p:cNvPr id="27" name="Wolkvormige toelichting 12">
+            <a:extLst>
+              <a:ext uri="{FF2B5EF4-FFF2-40B4-BE49-F238E27FC236}">
+                <a16:creationId xmlns:a16="http://schemas.microsoft.com/office/drawing/2014/main" id="{EFC1855E-DAA8-41E5-98B3-35A65FF5FA28}"/>
+              </a:ext>
+            </a:extLst>
+          </p:cNvPr>
+          <p:cNvSpPr/>
+          <p:nvPr/>
+        </p:nvSpPr>
+        <p:spPr>
+          <a:xfrm rot="10800000">
+            <a:off x="1827379" y="3237852"/>
+            <a:ext cx="2167417" cy="1316839"/>
+          </a:xfrm>
+          <a:prstGeom prst="cloudCallout">
+            <a:avLst>
+              <a:gd name="adj1" fmla="val -25627"/>
+              <a:gd name="adj2" fmla="val 67234"/>
+            </a:avLst>
+          </a:prstGeom>
+          <a:noFill/>
+          <a:ln w="12700">
+            <a:solidFill>
+              <a:schemeClr val="tx2">
+                <a:lumMod val="60000"/>
+                <a:lumOff val="40000"/>
+              </a:schemeClr>
+            </a:solidFill>
+          </a:ln>
+        </p:spPr>
+        <p:style>
+          <a:lnRef idx="1">
+            <a:schemeClr val="accent1"/>
+          </a:lnRef>
+          <a:fillRef idx="3">
+            <a:schemeClr val="accent1"/>
+          </a:fillRef>
+          <a:effectRef idx="2">
+            <a:schemeClr val="accent1"/>
+          </a:effectRef>
+          <a:fontRef idx="minor">
+            <a:schemeClr val="lt1"/>
+          </a:fontRef>
+        </p:style>
+        <p:txBody>
+          <a:bodyPr rtlCol="0" anchor="ctr"/>
+          <a:lstStyle/>
+          <a:p>
+            <a:pPr algn="ctr"/>
+            <a:endParaRPr lang="nl-NL"/>
+          </a:p>
+        </p:txBody>
+      </p:sp>
+      <p:sp>
+        <p:nvSpPr>
+          <p:cNvPr id="28" name="Tekstvak 13">
+            <a:extLst>
+              <a:ext uri="{FF2B5EF4-FFF2-40B4-BE49-F238E27FC236}">
+                <a16:creationId xmlns:a16="http://schemas.microsoft.com/office/drawing/2014/main" id="{045CAE2C-226A-4033-BF0A-9FB0887C06A4}"/>
+              </a:ext>
+            </a:extLst>
+          </p:cNvPr>
+          <p:cNvSpPr txBox="1"/>
+          <p:nvPr/>
+        </p:nvSpPr>
+        <p:spPr>
+          <a:xfrm>
+            <a:off x="2188856" y="3563900"/>
+            <a:ext cx="1712422" cy="738664"/>
+          </a:xfrm>
+          <a:prstGeom prst="rect">
+            <a:avLst/>
+          </a:prstGeom>
+          <a:noFill/>
+        </p:spPr>
+        <p:txBody>
+          <a:bodyPr wrap="square" rtlCol="0">
+            <a:spAutoFit/>
+          </a:bodyPr>
+          <a:lstStyle/>
+          <a:p>
+            <a:r>
+              <a:rPr lang="nl-NL" sz="1400" dirty="0"/>
+              <a:t>Ik ken H2 niet,</a:t>
+            </a:r>
+          </a:p>
+          <a:p>
+            <a:r>
+              <a:rPr lang="nl-NL" sz="1400" dirty="0"/>
+              <a:t>ik vraag het aan al m’n vrienden!</a:t>
+            </a:r>
+          </a:p>
+        </p:txBody>
+      </p:sp>
+    </p:spTree>
+    <p:extLst>
+      <p:ext uri="{BB962C8B-B14F-4D97-AF65-F5344CB8AC3E}">
+        <p14:creationId xmlns:p14="http://schemas.microsoft.com/office/powerpoint/2010/main" val="2725349193"/>
+      </p:ext>
+    </p:extLst>
+  </p:cSld>
+  <p:clrMapOvr>
+    <a:masterClrMapping/>
+  </p:clrMapOvr>
+</p:sld>
+</file>
+
+<file path=ppt/slides/slide11.xml><?xml version="1.0" encoding="utf-8"?>
+<p:sld xmlns:a="http://schemas.openxmlformats.org/drawingml/2006/main" xmlns:r="http://schemas.openxmlformats.org/officeDocument/2006/relationships" xmlns:p="http://schemas.openxmlformats.org/presentationml/2006/main">
+  <p:cSld>
+    <p:spTree>
+      <p:nvGrpSpPr>
+        <p:cNvPr id="1" name=""/>
+        <p:cNvGrpSpPr/>
+        <p:nvPr/>
+      </p:nvGrpSpPr>
+      <p:grpSpPr>
+        <a:xfrm>
+          <a:off x="0" y="0"/>
+          <a:ext cx="0" cy="0"/>
+          <a:chOff x="0" y="0"/>
+          <a:chExt cx="0" cy="0"/>
+        </a:xfrm>
+      </p:grpSpPr>
+      <p:sp>
+        <p:nvSpPr>
+          <p:cNvPr id="2" name="Title 1">
+            <a:extLst>
+              <a:ext uri="{FF2B5EF4-FFF2-40B4-BE49-F238E27FC236}">
+                <a16:creationId xmlns:a16="http://schemas.microsoft.com/office/drawing/2014/main" id="{9285FEAD-81E3-49EB-BC97-6BADD4F10646}"/>
+              </a:ext>
+            </a:extLst>
+          </p:cNvPr>
+          <p:cNvSpPr>
+            <a:spLocks noGrp="1"/>
+          </p:cNvSpPr>
+          <p:nvPr>
+            <p:ph type="title"/>
+          </p:nvPr>
+        </p:nvSpPr>
+        <p:spPr/>
+        <p:txBody>
+          <a:bodyPr/>
+          <a:lstStyle/>
+          <a:p>
+            <a:r>
+              <a:rPr lang="nl-NL" dirty="0"/>
+              <a:t>Communicatie in een traditioneel netwerk (3)</a:t>
+            </a:r>
+          </a:p>
+        </p:txBody>
+      </p:sp>
+      <p:sp>
+        <p:nvSpPr>
+          <p:cNvPr id="5" name="Date Placeholder 4">
+            <a:extLst>
+              <a:ext uri="{FF2B5EF4-FFF2-40B4-BE49-F238E27FC236}">
+                <a16:creationId xmlns:a16="http://schemas.microsoft.com/office/drawing/2014/main" id="{0B30BD42-E635-4819-A9F9-7BBA15C2634F}"/>
+              </a:ext>
+            </a:extLst>
+          </p:cNvPr>
+          <p:cNvSpPr>
+            <a:spLocks noGrp="1"/>
+          </p:cNvSpPr>
+          <p:nvPr>
+            <p:ph type="dt" sz="half" idx="13"/>
+          </p:nvPr>
+        </p:nvSpPr>
+        <p:spPr/>
+        <p:txBody>
+          <a:bodyPr/>
+          <a:lstStyle/>
+          <a:p>
+            <a:pPr>
+              <a:lnSpc>
+                <a:spcPts val="990"/>
+              </a:lnSpc>
+            </a:pPr>
+            <a:r>
+              <a:rPr lang="en-US"/>
+              <a:t>Workshop: Starten met Software Defined Networking</a:t>
+            </a:r>
+            <a:endParaRPr lang="nl-NL" dirty="0"/>
+          </a:p>
+        </p:txBody>
+      </p:sp>
+      <p:sp>
+        <p:nvSpPr>
+          <p:cNvPr id="6" name="Slide Number Placeholder 5">
+            <a:extLst>
+              <a:ext uri="{FF2B5EF4-FFF2-40B4-BE49-F238E27FC236}">
+                <a16:creationId xmlns:a16="http://schemas.microsoft.com/office/drawing/2014/main" id="{797EA126-818C-44F7-B7D5-35C66D690922}"/>
+              </a:ext>
+            </a:extLst>
+          </p:cNvPr>
+          <p:cNvSpPr>
+            <a:spLocks noGrp="1"/>
+          </p:cNvSpPr>
+          <p:nvPr>
+            <p:ph type="sldNum" sz="quarter" idx="15"/>
+          </p:nvPr>
+        </p:nvSpPr>
+        <p:spPr/>
+        <p:txBody>
+          <a:bodyPr/>
+          <a:lstStyle/>
+          <a:p>
+            <a:fld id="{253C79A4-34D5-4A22-8B02-BB0B9B92D27D}" type="slidenum">
+              <a:rPr lang="en-GB" smtClean="0"/>
+              <a:pPr/>
+              <a:t>11</a:t>
             </a:fld>
             <a:endParaRPr lang="en-GB" dirty="0"/>
           </a:p>
@@ -12875,7 +13499,7 @@
 </p:sld>
 </file>
 
-<file path=ppt/slides/slide11.xml><?xml version="1.0" encoding="utf-8"?>
+<file path=ppt/slides/slide12.xml><?xml version="1.0" encoding="utf-8"?>
 <p:sld xmlns:a="http://schemas.openxmlformats.org/drawingml/2006/main" xmlns:r="http://schemas.openxmlformats.org/officeDocument/2006/relationships" xmlns:p="http://schemas.openxmlformats.org/presentationml/2006/main">
   <p:cSld>
     <p:spTree>
@@ -12978,7 +13602,7 @@
             <a:fld id="{253C79A4-34D5-4A22-8B02-BB0B9B92D27D}" type="slidenum">
               <a:rPr lang="en-GB" smtClean="0"/>
               <a:pPr/>
-              <a:t>11</a:t>
+              <a:t>12</a:t>
             </a:fld>
             <a:endParaRPr lang="en-GB" dirty="0"/>
           </a:p>
@@ -13312,7 +13936,7 @@
 </p:sld>
 </file>
 
-<file path=ppt/slides/slide12.xml><?xml version="1.0" encoding="utf-8"?>
+<file path=ppt/slides/slide13.xml><?xml version="1.0" encoding="utf-8"?>
 <p:sld xmlns:a="http://schemas.openxmlformats.org/drawingml/2006/main" xmlns:r="http://schemas.openxmlformats.org/officeDocument/2006/relationships" xmlns:p="http://schemas.openxmlformats.org/presentationml/2006/main">
   <p:cSld>
     <p:spTree>
@@ -13415,7 +14039,7 @@
             <a:fld id="{253C79A4-34D5-4A22-8B02-BB0B9B92D27D}" type="slidenum">
               <a:rPr lang="en-GB" smtClean="0"/>
               <a:pPr/>
-              <a:t>12</a:t>
+              <a:t>13</a:t>
             </a:fld>
             <a:endParaRPr lang="en-GB" dirty="0"/>
           </a:p>
@@ -13948,7 +14572,7 @@
 </p:sld>
 </file>
 
-<file path=ppt/slides/slide13.xml><?xml version="1.0" encoding="utf-8"?>
+<file path=ppt/slides/slide14.xml><?xml version="1.0" encoding="utf-8"?>
 <p:sld xmlns:a="http://schemas.openxmlformats.org/drawingml/2006/main" xmlns:r="http://schemas.openxmlformats.org/officeDocument/2006/relationships" xmlns:p="http://schemas.openxmlformats.org/presentationml/2006/main">
   <p:cSld>
     <p:spTree>
@@ -14051,7 +14675,7 @@
             <a:fld id="{253C79A4-34D5-4A22-8B02-BB0B9B92D27D}" type="slidenum">
               <a:rPr lang="en-GB" smtClean="0"/>
               <a:pPr/>
-              <a:t>13</a:t>
+              <a:t>14</a:t>
             </a:fld>
             <a:endParaRPr lang="en-GB" dirty="0"/>
           </a:p>
@@ -14675,7 +15299,7 @@
 </p:sld>
 </file>
 
-<file path=ppt/slides/slide14.xml><?xml version="1.0" encoding="utf-8"?>
+<file path=ppt/slides/slide15.xml><?xml version="1.0" encoding="utf-8"?>
 <p:sld xmlns:a="http://schemas.openxmlformats.org/drawingml/2006/main" xmlns:r="http://schemas.openxmlformats.org/officeDocument/2006/relationships" xmlns:p="http://schemas.openxmlformats.org/presentationml/2006/main">
   <p:cSld>
     <p:spTree>
@@ -14778,7 +15402,7 @@
             <a:fld id="{253C79A4-34D5-4A22-8B02-BB0B9B92D27D}" type="slidenum">
               <a:rPr lang="en-GB" smtClean="0"/>
               <a:pPr/>
-              <a:t>14</a:t>
+              <a:t>15</a:t>
             </a:fld>
             <a:endParaRPr lang="en-GB" dirty="0"/>
           </a:p>
@@ -15265,404 +15889,6 @@
 </p:sld>
 </file>
 
-<file path=ppt/slides/slide15.xml><?xml version="1.0" encoding="utf-8"?>
-<p:sld xmlns:a="http://schemas.openxmlformats.org/drawingml/2006/main" xmlns:r="http://schemas.openxmlformats.org/officeDocument/2006/relationships" xmlns:p="http://schemas.openxmlformats.org/presentationml/2006/main">
-  <p:cSld>
-    <p:spTree>
-      <p:nvGrpSpPr>
-        <p:cNvPr id="1" name=""/>
-        <p:cNvGrpSpPr/>
-        <p:nvPr/>
-      </p:nvGrpSpPr>
-      <p:grpSpPr>
-        <a:xfrm>
-          <a:off x="0" y="0"/>
-          <a:ext cx="0" cy="0"/>
-          <a:chOff x="0" y="0"/>
-          <a:chExt cx="0" cy="0"/>
-        </a:xfrm>
-      </p:grpSpPr>
-      <p:sp>
-        <p:nvSpPr>
-          <p:cNvPr id="2" name="Title 1">
-            <a:extLst>
-              <a:ext uri="{FF2B5EF4-FFF2-40B4-BE49-F238E27FC236}">
-                <a16:creationId xmlns:a16="http://schemas.microsoft.com/office/drawing/2014/main" id="{FABFB207-9643-4CEB-910A-8D043E106A06}"/>
-              </a:ext>
-            </a:extLst>
-          </p:cNvPr>
-          <p:cNvSpPr>
-            <a:spLocks noGrp="1"/>
-          </p:cNvSpPr>
-          <p:nvPr>
-            <p:ph type="title"/>
-          </p:nvPr>
-        </p:nvSpPr>
-        <p:spPr/>
-        <p:txBody>
-          <a:bodyPr/>
-          <a:lstStyle/>
-          <a:p>
-            <a:r>
-              <a:rPr lang="nl-NL" dirty="0"/>
-              <a:t>HANDS-ON 1: ONOS en </a:t>
-            </a:r>
-            <a:r>
-              <a:rPr lang="nl-NL" dirty="0" err="1"/>
-              <a:t>Mininet</a:t>
-            </a:r>
-            <a:endParaRPr lang="nl-NL" dirty="0"/>
-          </a:p>
-        </p:txBody>
-      </p:sp>
-      <p:sp>
-        <p:nvSpPr>
-          <p:cNvPr id="3" name="Content Placeholder 2">
-            <a:extLst>
-              <a:ext uri="{FF2B5EF4-FFF2-40B4-BE49-F238E27FC236}">
-                <a16:creationId xmlns:a16="http://schemas.microsoft.com/office/drawing/2014/main" id="{D02C0806-BACA-4A10-9F47-4142F6A53A79}"/>
-              </a:ext>
-            </a:extLst>
-          </p:cNvPr>
-          <p:cNvSpPr>
-            <a:spLocks noGrp="1"/>
-          </p:cNvSpPr>
-          <p:nvPr>
-            <p:ph idx="1"/>
-          </p:nvPr>
-        </p:nvSpPr>
-        <p:spPr/>
-        <p:txBody>
-          <a:bodyPr/>
-          <a:lstStyle/>
-          <a:p>
-            <a:r>
-              <a:rPr lang="nl-NL" dirty="0">
-                <a:latin typeface="KPN Sans Light" panose="020B0604020202020204" charset="0"/>
-              </a:rPr>
-              <a:t>Allereerst kleine Demo als voorbeeld</a:t>
-            </a:r>
-          </a:p>
-          <a:p>
-            <a:r>
-              <a:rPr lang="nl-NL" dirty="0">
-                <a:latin typeface="KPN Sans Light" panose="020B0604020202020204" charset="0"/>
-              </a:rPr>
-              <a:t>In de tutorial, werk door:</a:t>
-            </a:r>
-          </a:p>
-          <a:p>
-            <a:pPr lvl="1"/>
-            <a:r>
-              <a:rPr lang="nl-NL" dirty="0">
-                <a:latin typeface="KPN Sans Light" panose="020B0604020202020204" charset="0"/>
-              </a:rPr>
-              <a:t>Ontdek ONOS</a:t>
-            </a:r>
-          </a:p>
-          <a:p>
-            <a:pPr lvl="1"/>
-            <a:r>
-              <a:rPr lang="nl-NL" dirty="0">
-                <a:latin typeface="KPN Sans Light" panose="020B0604020202020204" charset="0"/>
-              </a:rPr>
-              <a:t>Je eigen netwerk met </a:t>
-            </a:r>
-            <a:r>
-              <a:rPr lang="nl-NL" dirty="0" err="1">
-                <a:latin typeface="KPN Sans Light" panose="020B0604020202020204" charset="0"/>
-              </a:rPr>
-              <a:t>Mininet</a:t>
-            </a:r>
-            <a:endParaRPr lang="nl-NL" dirty="0">
-              <a:latin typeface="KPN Sans Light" panose="020B0604020202020204" charset="0"/>
-            </a:endParaRPr>
-          </a:p>
-          <a:p>
-            <a:pPr marL="0" indent="0">
-              <a:buNone/>
-            </a:pPr>
-            <a:endParaRPr lang="nl-NL" b="1" dirty="0">
-              <a:latin typeface="KPN Sans Light" panose="020B0604020202020204" charset="0"/>
-            </a:endParaRPr>
-          </a:p>
-          <a:p>
-            <a:r>
-              <a:rPr lang="nl-NL" b="1" dirty="0">
-                <a:latin typeface="KPN Sans Light" panose="020B0604020202020204" charset="0"/>
-              </a:rPr>
-              <a:t>Workshopmateriaal via: </a:t>
-            </a:r>
-            <a:r>
-              <a:rPr lang="nl-NL" dirty="0">
-                <a:latin typeface="KPN Sans Light" panose="020B0604020202020204" charset="0"/>
-                <a:hlinkClick r:id="rId2"/>
-              </a:rPr>
-              <a:t>www.github.com/Marlou16/sdn-tutorial</a:t>
-            </a:r>
-            <a:br>
-              <a:rPr lang="nl-NL" dirty="0">
-                <a:latin typeface="KPN Sans Light" panose="020B0604020202020204" charset="0"/>
-              </a:rPr>
-            </a:br>
-            <a:r>
-              <a:rPr lang="nl-NL" dirty="0">
-                <a:latin typeface="KPN Sans Light" panose="020B0604020202020204" charset="0"/>
-              </a:rPr>
-              <a:t>(ook te laden op de VM zelf, voor het betere ‘kopieer-plak-werk’)</a:t>
-            </a:r>
-            <a:endParaRPr lang="nl-NL" b="1" dirty="0">
-              <a:latin typeface="KPN Sans Light" panose="020B0604020202020204" charset="0"/>
-            </a:endParaRPr>
-          </a:p>
-        </p:txBody>
-      </p:sp>
-      <p:sp>
-        <p:nvSpPr>
-          <p:cNvPr id="5" name="Date Placeholder 4">
-            <a:extLst>
-              <a:ext uri="{FF2B5EF4-FFF2-40B4-BE49-F238E27FC236}">
-                <a16:creationId xmlns:a16="http://schemas.microsoft.com/office/drawing/2014/main" id="{BB67C49F-D0AF-48F2-BC5F-4CB884C21EF3}"/>
-              </a:ext>
-            </a:extLst>
-          </p:cNvPr>
-          <p:cNvSpPr>
-            <a:spLocks noGrp="1"/>
-          </p:cNvSpPr>
-          <p:nvPr>
-            <p:ph type="dt" sz="half" idx="13"/>
-          </p:nvPr>
-        </p:nvSpPr>
-        <p:spPr/>
-        <p:txBody>
-          <a:bodyPr/>
-          <a:lstStyle/>
-          <a:p>
-            <a:pPr marL="0" marR="0" lvl="0" indent="0" algn="l" defTabSz="914400" rtl="0" eaLnBrk="1" fontAlgn="auto" latinLnBrk="0" hangingPunct="1">
-              <a:lnSpc>
-                <a:spcPts val="990"/>
-              </a:lnSpc>
-              <a:spcBef>
-                <a:spcPts val="0"/>
-              </a:spcBef>
-              <a:spcAft>
-                <a:spcPts val="0"/>
-              </a:spcAft>
-              <a:buClrTx/>
-              <a:buSzTx/>
-              <a:buFontTx/>
-              <a:buNone/>
-              <a:tabLst/>
-              <a:defRPr/>
-            </a:pPr>
-            <a:r>
-              <a:rPr kumimoji="0" lang="en-US" sz="800" b="0" i="0" u="none" strike="noStrike" kern="1200" cap="none" spc="0" normalizeH="0" baseline="0" noProof="0">
-                <a:ln>
-                  <a:noFill/>
-                </a:ln>
-                <a:solidFill>
-                  <a:srgbClr val="009900"/>
-                </a:solidFill>
-                <a:effectLst/>
-                <a:uLnTx/>
-                <a:uFillTx/>
-                <a:latin typeface="KPN Accent Light" panose="020B0403040000060004" pitchFamily="34" charset="0"/>
-                <a:ea typeface="+mn-ea"/>
-                <a:cs typeface="+mn-cs"/>
-              </a:rPr>
-              <a:t>Workshop: Starten met Software Defined Networking</a:t>
-            </a:r>
-            <a:endParaRPr kumimoji="0" lang="nl-NL" sz="800" b="0" i="0" u="none" strike="noStrike" kern="1200" cap="none" spc="0" normalizeH="0" baseline="0" noProof="0" dirty="0">
-              <a:ln>
-                <a:noFill/>
-              </a:ln>
-              <a:solidFill>
-                <a:srgbClr val="009900"/>
-              </a:solidFill>
-              <a:effectLst/>
-              <a:uLnTx/>
-              <a:uFillTx/>
-              <a:latin typeface="KPN Accent Light" panose="020B0403040000060004" pitchFamily="34" charset="0"/>
-              <a:ea typeface="+mn-ea"/>
-              <a:cs typeface="+mn-cs"/>
-            </a:endParaRPr>
-          </a:p>
-        </p:txBody>
-      </p:sp>
-      <p:sp>
-        <p:nvSpPr>
-          <p:cNvPr id="6" name="Slide Number Placeholder 5">
-            <a:extLst>
-              <a:ext uri="{FF2B5EF4-FFF2-40B4-BE49-F238E27FC236}">
-                <a16:creationId xmlns:a16="http://schemas.microsoft.com/office/drawing/2014/main" id="{7D328F17-81D2-403D-8D18-0A005370FDF0}"/>
-              </a:ext>
-            </a:extLst>
-          </p:cNvPr>
-          <p:cNvSpPr>
-            <a:spLocks noGrp="1"/>
-          </p:cNvSpPr>
-          <p:nvPr>
-            <p:ph type="sldNum" sz="quarter" idx="15"/>
-          </p:nvPr>
-        </p:nvSpPr>
-        <p:spPr/>
-        <p:txBody>
-          <a:bodyPr/>
-          <a:lstStyle/>
-          <a:p>
-            <a:pPr marL="0" marR="0" lvl="0" indent="0" algn="l" defTabSz="914400" rtl="0" eaLnBrk="1" fontAlgn="auto" latinLnBrk="0" hangingPunct="1">
-              <a:lnSpc>
-                <a:spcPts val="990"/>
-              </a:lnSpc>
-              <a:spcBef>
-                <a:spcPts val="0"/>
-              </a:spcBef>
-              <a:spcAft>
-                <a:spcPts val="0"/>
-              </a:spcAft>
-              <a:buClrTx/>
-              <a:buSzTx/>
-              <a:buFontTx/>
-              <a:buNone/>
-              <a:tabLst/>
-              <a:defRPr/>
-            </a:pPr>
-            <a:fld id="{253C79A4-34D5-4A22-8B02-BB0B9B92D27D}" type="slidenum">
-              <a:rPr kumimoji="0" lang="en-GB" sz="800" b="1" i="0" u="none" strike="noStrike" kern="1200" cap="none" spc="0" normalizeH="0" baseline="0" noProof="0" smtClean="0">
-                <a:ln>
-                  <a:noFill/>
-                </a:ln>
-                <a:solidFill>
-                  <a:srgbClr val="009900"/>
-                </a:solidFill>
-                <a:effectLst/>
-                <a:uLnTx/>
-                <a:uFillTx/>
-                <a:latin typeface="KPN Accent"/>
-                <a:ea typeface="+mn-ea"/>
-                <a:cs typeface="+mn-cs"/>
-              </a:rPr>
-              <a:pPr marL="0" marR="0" lvl="0" indent="0" algn="l" defTabSz="914400" rtl="0" eaLnBrk="1" fontAlgn="auto" latinLnBrk="0" hangingPunct="1">
-                <a:lnSpc>
-                  <a:spcPts val="990"/>
-                </a:lnSpc>
-                <a:spcBef>
-                  <a:spcPts val="0"/>
-                </a:spcBef>
-                <a:spcAft>
-                  <a:spcPts val="0"/>
-                </a:spcAft>
-                <a:buClrTx/>
-                <a:buSzTx/>
-                <a:buFontTx/>
-                <a:buNone/>
-                <a:tabLst/>
-                <a:defRPr/>
-              </a:pPr>
-              <a:t>15</a:t>
-            </a:fld>
-            <a:endParaRPr kumimoji="0" lang="en-GB" sz="800" b="1" i="0" u="none" strike="noStrike" kern="1200" cap="none" spc="0" normalizeH="0" baseline="0" noProof="0" dirty="0">
-              <a:ln>
-                <a:noFill/>
-              </a:ln>
-              <a:solidFill>
-                <a:srgbClr val="009900"/>
-              </a:solidFill>
-              <a:effectLst/>
-              <a:uLnTx/>
-              <a:uFillTx/>
-              <a:latin typeface="KPN Accent"/>
-              <a:ea typeface="+mn-ea"/>
-              <a:cs typeface="+mn-cs"/>
-            </a:endParaRPr>
-          </a:p>
-        </p:txBody>
-      </p:sp>
-      <p:sp>
-        <p:nvSpPr>
-          <p:cNvPr id="7" name="Footer Placeholder 6">
-            <a:extLst>
-              <a:ext uri="{FF2B5EF4-FFF2-40B4-BE49-F238E27FC236}">
-                <a16:creationId xmlns:a16="http://schemas.microsoft.com/office/drawing/2014/main" id="{AB587746-35C8-4627-863E-50A6AAE4BB46}"/>
-              </a:ext>
-            </a:extLst>
-          </p:cNvPr>
-          <p:cNvSpPr>
-            <a:spLocks noGrp="1"/>
-          </p:cNvSpPr>
-          <p:nvPr>
-            <p:ph type="ftr" sz="quarter" idx="3"/>
-          </p:nvPr>
-        </p:nvSpPr>
-        <p:spPr/>
-        <p:txBody>
-          <a:bodyPr/>
-          <a:lstStyle/>
-          <a:p>
-            <a:pPr marL="0" marR="0" lvl="0" indent="0" algn="l" defTabSz="914400" rtl="0" eaLnBrk="1" fontAlgn="auto" latinLnBrk="0" hangingPunct="1">
-              <a:lnSpc>
-                <a:spcPct val="100000"/>
-              </a:lnSpc>
-              <a:spcBef>
-                <a:spcPts val="0"/>
-              </a:spcBef>
-              <a:spcAft>
-                <a:spcPts val="0"/>
-              </a:spcAft>
-              <a:buClrTx/>
-              <a:buSzTx/>
-              <a:buFontTx/>
-              <a:buNone/>
-              <a:tabLst/>
-              <a:defRPr/>
-            </a:pPr>
-            <a:r>
-              <a:rPr kumimoji="0" lang="nl-NL" sz="800" b="0" i="0" u="none" strike="noStrike" kern="1200" cap="none" spc="0" normalizeH="0" baseline="0" noProof="0">
-                <a:ln>
-                  <a:noFill/>
-                </a:ln>
-                <a:solidFill>
-                  <a:srgbClr val="009900"/>
-                </a:solidFill>
-                <a:effectLst/>
-                <a:uLnTx/>
-                <a:uFillTx/>
-                <a:latin typeface="KPN Accent Light" panose="020B0403040000060004" pitchFamily="34" charset="0"/>
-                <a:ea typeface="+mn-ea"/>
-                <a:cs typeface="+mn-cs"/>
-              </a:rPr>
-              <a:t>Marlou Pors</a:t>
-            </a:r>
-            <a:endParaRPr kumimoji="0" lang="nl-NL" sz="800" b="0" i="0" u="none" strike="noStrike" kern="1200" cap="none" spc="0" normalizeH="0" baseline="0" noProof="0" dirty="0">
-              <a:ln>
-                <a:noFill/>
-              </a:ln>
-              <a:solidFill>
-                <a:srgbClr val="009900"/>
-              </a:solidFill>
-              <a:effectLst/>
-              <a:uLnTx/>
-              <a:uFillTx/>
-              <a:latin typeface="KPN Accent Light" panose="020B0403040000060004" pitchFamily="34" charset="0"/>
-              <a:ea typeface="+mn-ea"/>
-              <a:cs typeface="+mn-cs"/>
-            </a:endParaRPr>
-          </a:p>
-        </p:txBody>
-      </p:sp>
-    </p:spTree>
-    <p:extLst>
-      <p:ext uri="{BB962C8B-B14F-4D97-AF65-F5344CB8AC3E}">
-        <p14:creationId xmlns:p14="http://schemas.microsoft.com/office/powerpoint/2010/main" val="679297329"/>
-      </p:ext>
-    </p:extLst>
-  </p:cSld>
-  <p:clrMapOvr>
-    <a:masterClrMapping/>
-  </p:clrMapOvr>
-</p:sld>
-</file>
-
 <file path=ppt/slides/slide16.xml><?xml version="1.0" encoding="utf-8"?>
 <p:sld xmlns:a="http://schemas.openxmlformats.org/drawingml/2006/main" xmlns:r="http://schemas.openxmlformats.org/officeDocument/2006/relationships" xmlns:p="http://schemas.openxmlformats.org/presentationml/2006/main">
   <p:cSld>
@@ -15703,19 +15929,11 @@
           <a:p>
             <a:r>
               <a:rPr lang="nl-NL" dirty="0"/>
-              <a:t>HANDS-ON 2: </a:t>
+              <a:t>HANDS-ON 1: ONOS en </a:t>
             </a:r>
             <a:r>
               <a:rPr lang="nl-NL" dirty="0" err="1"/>
-              <a:t>OpenFlow</a:t>
-            </a:r>
-            <a:r>
-              <a:rPr lang="nl-NL" dirty="0"/>
-              <a:t> met </a:t>
-            </a:r>
-            <a:r>
-              <a:rPr lang="nl-NL" dirty="0" err="1"/>
-              <a:t>Wireshark</a:t>
+              <a:t>Mininet</a:t>
             </a:r>
             <a:endParaRPr lang="nl-NL" dirty="0"/>
           </a:p>
@@ -15763,46 +15981,22 @@
               <a:rPr lang="nl-NL" dirty="0">
                 <a:latin typeface="KPN Sans Light" panose="020B0604020202020204" charset="0"/>
               </a:rPr>
-              <a:t>Het </a:t>
+              <a:t>Ontdek ONOS</a:t>
+            </a:r>
+          </a:p>
+          <a:p>
+            <a:pPr lvl="1"/>
+            <a:r>
+              <a:rPr lang="nl-NL" dirty="0">
+                <a:latin typeface="KPN Sans Light" panose="020B0604020202020204" charset="0"/>
+              </a:rPr>
+              <a:t>Je eigen netwerk met </a:t>
             </a:r>
             <a:r>
               <a:rPr lang="nl-NL" dirty="0" err="1">
                 <a:latin typeface="KPN Sans Light" panose="020B0604020202020204" charset="0"/>
               </a:rPr>
-              <a:t>OpenFlow</a:t>
-            </a:r>
-            <a:r>
-              <a:rPr lang="nl-NL" dirty="0">
-                <a:latin typeface="KPN Sans Light" panose="020B0604020202020204" charset="0"/>
-              </a:rPr>
-              <a:t> Protocol</a:t>
-            </a:r>
-          </a:p>
-          <a:p>
-            <a:pPr lvl="1"/>
-            <a:r>
-              <a:rPr lang="nl-NL" dirty="0">
-                <a:latin typeface="KPN Sans Light" panose="020B0604020202020204" charset="0"/>
-              </a:rPr>
-              <a:t>Bestudeer </a:t>
-            </a:r>
-            <a:r>
-              <a:rPr lang="nl-NL" dirty="0" err="1">
-                <a:latin typeface="KPN Sans Light" panose="020B0604020202020204" charset="0"/>
-              </a:rPr>
-              <a:t>OpenFlow</a:t>
-            </a:r>
-            <a:r>
-              <a:rPr lang="nl-NL" dirty="0">
-                <a:latin typeface="KPN Sans Light" panose="020B0604020202020204" charset="0"/>
-              </a:rPr>
-              <a:t> met </a:t>
-            </a:r>
-            <a:r>
-              <a:rPr lang="nl-NL" dirty="0" err="1">
-                <a:latin typeface="KPN Sans Light" panose="020B0604020202020204" charset="0"/>
-              </a:rPr>
-              <a:t>Wireshark</a:t>
+              <a:t>Mininet</a:t>
             </a:r>
             <a:endParaRPr lang="nl-NL" dirty="0">
               <a:latin typeface="KPN Sans Light" panose="020B0604020202020204" charset="0"/>
@@ -16083,7 +16277,7 @@
     </p:spTree>
     <p:extLst>
       <p:ext uri="{BB962C8B-B14F-4D97-AF65-F5344CB8AC3E}">
-        <p14:creationId xmlns:p14="http://schemas.microsoft.com/office/powerpoint/2010/main" val="2357513955"/>
+        <p14:creationId xmlns:p14="http://schemas.microsoft.com/office/powerpoint/2010/main" val="679297329"/>
       </p:ext>
     </p:extLst>
   </p:cSld>
@@ -16115,196 +16309,6 @@
           <p:cNvPr id="2" name="Title 1">
             <a:extLst>
               <a:ext uri="{FF2B5EF4-FFF2-40B4-BE49-F238E27FC236}">
-                <a16:creationId xmlns:a16="http://schemas.microsoft.com/office/drawing/2014/main" id="{66A174C9-9993-42A3-843B-384D4C4138B3}"/>
-              </a:ext>
-            </a:extLst>
-          </p:cNvPr>
-          <p:cNvSpPr>
-            <a:spLocks noGrp="1"/>
-          </p:cNvSpPr>
-          <p:nvPr>
-            <p:ph type="title"/>
-          </p:nvPr>
-        </p:nvSpPr>
-        <p:spPr/>
-        <p:txBody>
-          <a:bodyPr/>
-          <a:lstStyle/>
-          <a:p>
-            <a:r>
-              <a:rPr lang="nl-NL" dirty="0" err="1"/>
-              <a:t>Recap</a:t>
-            </a:r>
-            <a:r>
-              <a:rPr lang="nl-NL" dirty="0"/>
-              <a:t>: SDN in context</a:t>
-            </a:r>
-          </a:p>
-        </p:txBody>
-      </p:sp>
-      <p:sp>
-        <p:nvSpPr>
-          <p:cNvPr id="5" name="Date Placeholder 4">
-            <a:extLst>
-              <a:ext uri="{FF2B5EF4-FFF2-40B4-BE49-F238E27FC236}">
-                <a16:creationId xmlns:a16="http://schemas.microsoft.com/office/drawing/2014/main" id="{7D2F8588-9D49-4498-B5C3-267F332045C9}"/>
-              </a:ext>
-            </a:extLst>
-          </p:cNvPr>
-          <p:cNvSpPr>
-            <a:spLocks noGrp="1"/>
-          </p:cNvSpPr>
-          <p:nvPr>
-            <p:ph type="dt" sz="half" idx="13"/>
-          </p:nvPr>
-        </p:nvSpPr>
-        <p:spPr/>
-        <p:txBody>
-          <a:bodyPr/>
-          <a:lstStyle/>
-          <a:p>
-            <a:pPr>
-              <a:lnSpc>
-                <a:spcPts val="990"/>
-              </a:lnSpc>
-            </a:pPr>
-            <a:r>
-              <a:rPr lang="en-US"/>
-              <a:t>Workshop: Starten met Software Defined Networking</a:t>
-            </a:r>
-            <a:endParaRPr lang="nl-NL" dirty="0"/>
-          </a:p>
-        </p:txBody>
-      </p:sp>
-      <p:sp>
-        <p:nvSpPr>
-          <p:cNvPr id="6" name="Slide Number Placeholder 5">
-            <a:extLst>
-              <a:ext uri="{FF2B5EF4-FFF2-40B4-BE49-F238E27FC236}">
-                <a16:creationId xmlns:a16="http://schemas.microsoft.com/office/drawing/2014/main" id="{0D4933F1-36FF-4460-8F8B-465253D54AFF}"/>
-              </a:ext>
-            </a:extLst>
-          </p:cNvPr>
-          <p:cNvSpPr>
-            <a:spLocks noGrp="1"/>
-          </p:cNvSpPr>
-          <p:nvPr>
-            <p:ph type="sldNum" sz="quarter" idx="15"/>
-          </p:nvPr>
-        </p:nvSpPr>
-        <p:spPr/>
-        <p:txBody>
-          <a:bodyPr/>
-          <a:lstStyle/>
-          <a:p>
-            <a:fld id="{253C79A4-34D5-4A22-8B02-BB0B9B92D27D}" type="slidenum">
-              <a:rPr lang="en-GB" smtClean="0"/>
-              <a:pPr/>
-              <a:t>17</a:t>
-            </a:fld>
-            <a:endParaRPr lang="en-GB" dirty="0"/>
-          </a:p>
-        </p:txBody>
-      </p:sp>
-      <p:sp>
-        <p:nvSpPr>
-          <p:cNvPr id="7" name="Footer Placeholder 6">
-            <a:extLst>
-              <a:ext uri="{FF2B5EF4-FFF2-40B4-BE49-F238E27FC236}">
-                <a16:creationId xmlns:a16="http://schemas.microsoft.com/office/drawing/2014/main" id="{EB1DC3A6-F360-4B3B-A292-59C819E6EFED}"/>
-              </a:ext>
-            </a:extLst>
-          </p:cNvPr>
-          <p:cNvSpPr>
-            <a:spLocks noGrp="1"/>
-          </p:cNvSpPr>
-          <p:nvPr>
-            <p:ph type="ftr" sz="quarter" idx="3"/>
-          </p:nvPr>
-        </p:nvSpPr>
-        <p:spPr/>
-        <p:txBody>
-          <a:bodyPr/>
-          <a:lstStyle/>
-          <a:p>
-            <a:r>
-              <a:rPr lang="nl-NL"/>
-              <a:t>Marlou Pors</a:t>
-            </a:r>
-            <a:endParaRPr lang="nl-NL" dirty="0"/>
-          </a:p>
-        </p:txBody>
-      </p:sp>
-      <p:pic>
-        <p:nvPicPr>
-          <p:cNvPr id="13" name="Content Placeholder 12">
-            <a:extLst>
-              <a:ext uri="{FF2B5EF4-FFF2-40B4-BE49-F238E27FC236}">
-                <a16:creationId xmlns:a16="http://schemas.microsoft.com/office/drawing/2014/main" id="{C1D26CE8-E408-4733-A0A2-3C6FD5B55F05}"/>
-              </a:ext>
-            </a:extLst>
-          </p:cNvPr>
-          <p:cNvPicPr>
-            <a:picLocks noGrp="1" noChangeAspect="1"/>
-          </p:cNvPicPr>
-          <p:nvPr>
-            <p:ph idx="1"/>
-          </p:nvPr>
-        </p:nvPicPr>
-        <p:blipFill>
-          <a:blip r:embed="rId2">
-            <a:extLst>
-              <a:ext uri="{28A0092B-C50C-407E-A947-70E740481C1C}">
-                <a14:useLocalDpi xmlns:a14="http://schemas.microsoft.com/office/drawing/2010/main" val="0"/>
-              </a:ext>
-            </a:extLst>
-          </a:blip>
-          <a:stretch>
-            <a:fillRect/>
-          </a:stretch>
-        </p:blipFill>
-        <p:spPr>
-          <a:xfrm>
-            <a:off x="2194124" y="1254125"/>
-            <a:ext cx="4820840" cy="3168650"/>
-          </a:xfrm>
-        </p:spPr>
-      </p:pic>
-    </p:spTree>
-    <p:extLst>
-      <p:ext uri="{BB962C8B-B14F-4D97-AF65-F5344CB8AC3E}">
-        <p14:creationId xmlns:p14="http://schemas.microsoft.com/office/powerpoint/2010/main" val="3887659378"/>
-      </p:ext>
-    </p:extLst>
-  </p:cSld>
-  <p:clrMapOvr>
-    <a:masterClrMapping/>
-  </p:clrMapOvr>
-</p:sld>
-</file>
-
-<file path=ppt/slides/slide18.xml><?xml version="1.0" encoding="utf-8"?>
-<p:sld xmlns:a="http://schemas.openxmlformats.org/drawingml/2006/main" xmlns:r="http://schemas.openxmlformats.org/officeDocument/2006/relationships" xmlns:p="http://schemas.openxmlformats.org/presentationml/2006/main">
-  <p:cSld>
-    <p:spTree>
-      <p:nvGrpSpPr>
-        <p:cNvPr id="1" name=""/>
-        <p:cNvGrpSpPr/>
-        <p:nvPr/>
-      </p:nvGrpSpPr>
-      <p:grpSpPr>
-        <a:xfrm>
-          <a:off x="0" y="0"/>
-          <a:ext cx="0" cy="0"/>
-          <a:chOff x="0" y="0"/>
-          <a:chExt cx="0" cy="0"/>
-        </a:xfrm>
-      </p:grpSpPr>
-      <p:sp>
-        <p:nvSpPr>
-          <p:cNvPr id="2" name="Title 1">
-            <a:extLst>
-              <a:ext uri="{FF2B5EF4-FFF2-40B4-BE49-F238E27FC236}">
                 <a16:creationId xmlns:a16="http://schemas.microsoft.com/office/drawing/2014/main" id="{FABFB207-9643-4CEB-910A-8D043E106A06}"/>
               </a:ext>
             </a:extLst>
@@ -16323,19 +16327,19 @@
           <a:p>
             <a:r>
               <a:rPr lang="nl-NL" dirty="0"/>
-              <a:t>HANDS-ON 3: </a:t>
+              <a:t>HANDS-ON 2: </a:t>
             </a:r>
             <a:r>
               <a:rPr lang="nl-NL" dirty="0" err="1"/>
-              <a:t>Intent-based</a:t>
+              <a:t>OpenFlow</a:t>
             </a:r>
             <a:r>
               <a:rPr lang="nl-NL" dirty="0"/>
-              <a:t> </a:t>
+              <a:t> met </a:t>
             </a:r>
             <a:r>
               <a:rPr lang="nl-NL" dirty="0" err="1"/>
-              <a:t>Forwarding</a:t>
+              <a:t>Wireshark</a:t>
             </a:r>
             <a:endParaRPr lang="nl-NL" dirty="0"/>
           </a:p>
@@ -16370,48 +16374,6 @@
             </a:r>
           </a:p>
           <a:p>
-            <a:pPr lvl="1"/>
-            <a:r>
-              <a:rPr lang="nl-NL" dirty="0">
-                <a:latin typeface="KPN Sans Light" panose="020B0604020202020204" charset="0"/>
-              </a:rPr>
-              <a:t>Installeren van een nieuwe applicatie</a:t>
-            </a:r>
-          </a:p>
-          <a:p>
-            <a:pPr lvl="1"/>
-            <a:r>
-              <a:rPr lang="nl-NL" dirty="0" err="1">
-                <a:latin typeface="KPN Sans Light" panose="020B0604020202020204" charset="0"/>
-              </a:rPr>
-              <a:t>Intent-based</a:t>
-            </a:r>
-            <a:r>
-              <a:rPr lang="nl-NL" dirty="0">
-                <a:latin typeface="KPN Sans Light" panose="020B0604020202020204" charset="0"/>
-              </a:rPr>
-              <a:t> </a:t>
-            </a:r>
-            <a:r>
-              <a:rPr lang="nl-NL" dirty="0" err="1">
-                <a:latin typeface="KPN Sans Light" panose="020B0604020202020204" charset="0"/>
-              </a:rPr>
-              <a:t>Forwarding</a:t>
-            </a:r>
-            <a:endParaRPr lang="nl-NL" dirty="0">
-              <a:latin typeface="KPN Sans Light" panose="020B0604020202020204" charset="0"/>
-            </a:endParaRPr>
-          </a:p>
-          <a:p>
-            <a:pPr lvl="1"/>
-            <a:r>
-              <a:rPr lang="nl-NL" dirty="0">
-                <a:latin typeface="KPN Sans Light" panose="020B0604020202020204" charset="0"/>
-              </a:rPr>
-              <a:t>Hoe gaat de controller om met dynamische netwerken</a:t>
-            </a:r>
-          </a:p>
-          <a:p>
             <a:r>
               <a:rPr lang="nl-NL" dirty="0">
                 <a:latin typeface="KPN Sans Light" panose="020B0604020202020204" charset="0"/>
@@ -16425,86 +16387,55 @@
               <a:rPr lang="nl-NL" dirty="0">
                 <a:latin typeface="KPN Sans Light" panose="020B0604020202020204" charset="0"/>
               </a:rPr>
-              <a:t>Next-level SDN: </a:t>
+              <a:t>Het </a:t>
             </a:r>
             <a:r>
               <a:rPr lang="nl-NL" dirty="0" err="1">
                 <a:latin typeface="KPN Sans Light" panose="020B0604020202020204" charset="0"/>
               </a:rPr>
-              <a:t>Intent-based</a:t>
+              <a:t>OpenFlow</a:t>
             </a:r>
             <a:r>
               <a:rPr lang="nl-NL" dirty="0">
                 <a:latin typeface="KPN Sans Light" panose="020B0604020202020204" charset="0"/>
               </a:rPr>
-              <a:t> </a:t>
+              <a:t> Protocol</a:t>
+            </a:r>
+          </a:p>
+          <a:p>
+            <a:pPr lvl="1"/>
+            <a:r>
+              <a:rPr lang="nl-NL" dirty="0">
+                <a:latin typeface="KPN Sans Light" panose="020B0604020202020204" charset="0"/>
+              </a:rPr>
+              <a:t>Bestudeer </a:t>
             </a:r>
             <a:r>
               <a:rPr lang="nl-NL" dirty="0" err="1">
                 <a:latin typeface="KPN Sans Light" panose="020B0604020202020204" charset="0"/>
               </a:rPr>
-              <a:t>Forwarding</a:t>
+              <a:t>OpenFlow</a:t>
+            </a:r>
+            <a:r>
+              <a:rPr lang="nl-NL" dirty="0">
+                <a:latin typeface="KPN Sans Light" panose="020B0604020202020204" charset="0"/>
+              </a:rPr>
+              <a:t> met </a:t>
+            </a:r>
+            <a:r>
+              <a:rPr lang="nl-NL" dirty="0" err="1">
+                <a:latin typeface="KPN Sans Light" panose="020B0604020202020204" charset="0"/>
+              </a:rPr>
+              <a:t>Wireshark</a:t>
             </a:r>
             <a:endParaRPr lang="nl-NL" dirty="0">
               <a:latin typeface="KPN Sans Light" panose="020B0604020202020204" charset="0"/>
             </a:endParaRPr>
           </a:p>
           <a:p>
-            <a:pPr lvl="1"/>
-            <a:r>
-              <a:rPr lang="nl-NL" b="1" dirty="0">
-                <a:latin typeface="KPN Sans Light" panose="020B0604020202020204" charset="0"/>
-              </a:rPr>
-              <a:t>(Bonus) </a:t>
-            </a:r>
-            <a:r>
-              <a:rPr lang="nl-NL" dirty="0">
-                <a:latin typeface="KPN Sans Light" panose="020B0604020202020204" charset="0"/>
-              </a:rPr>
-              <a:t>“</a:t>
-            </a:r>
-            <a:r>
-              <a:rPr lang="nl-NL" dirty="0" err="1">
-                <a:latin typeface="KPN Sans Light" panose="020B0604020202020204" charset="0"/>
-              </a:rPr>
-              <a:t>Try</a:t>
-            </a:r>
-            <a:r>
-              <a:rPr lang="nl-NL" dirty="0">
-                <a:latin typeface="KPN Sans Light" panose="020B0604020202020204" charset="0"/>
-              </a:rPr>
-              <a:t> </a:t>
-            </a:r>
-            <a:r>
-              <a:rPr lang="nl-NL" dirty="0" err="1">
-                <a:latin typeface="KPN Sans Light" panose="020B0604020202020204" charset="0"/>
-              </a:rPr>
-              <a:t>it</a:t>
-            </a:r>
-            <a:r>
-              <a:rPr lang="nl-NL" dirty="0">
-                <a:latin typeface="KPN Sans Light" panose="020B0604020202020204" charset="0"/>
-              </a:rPr>
-              <a:t> </a:t>
-            </a:r>
-            <a:r>
-              <a:rPr lang="nl-NL" dirty="0" err="1">
-                <a:latin typeface="KPN Sans Light" panose="020B0604020202020204" charset="0"/>
-              </a:rPr>
-              <a:t>all</a:t>
-            </a:r>
-            <a:r>
-              <a:rPr lang="nl-NL" dirty="0">
-                <a:latin typeface="KPN Sans Light" panose="020B0604020202020204" charset="0"/>
-              </a:rPr>
-              <a:t>” opgave</a:t>
-            </a:r>
-            <a:endParaRPr lang="nl-NL" b="1" dirty="0">
-              <a:latin typeface="KPN Sans Light" panose="020B0604020202020204" charset="0"/>
-            </a:endParaRPr>
-          </a:p>
-          <a:p>
-            <a:pPr lvl="1"/>
+            <a:pPr marL="0" indent="0">
+              <a:buNone/>
+            </a:pPr>
             <a:endParaRPr lang="nl-NL" b="1" dirty="0">
               <a:latin typeface="KPN Sans Light" panose="020B0604020202020204" charset="0"/>
             </a:endParaRPr>
@@ -16522,6 +16453,17 @@
                 <a:hlinkClick r:id="rId2"/>
               </a:rPr>
               <a:t>www.github.com/Marlou16/sdn-tutorial</a:t>
+            </a:r>
+            <a:br>
+              <a:rPr lang="nl-NL" dirty="0">
+                <a:latin typeface="KPN Sans Light" panose="020B0604020202020204" charset="0"/>
+              </a:rPr>
+            </a:br>
+            <a:r>
+              <a:rPr lang="nl-NL" dirty="0">
+                <a:latin typeface="KPN Sans Light" panose="020B0604020202020204" charset="0"/>
+              </a:rPr>
+              <a:t>(ook te laden op de VM zelf, voor het betere ‘kopieer-plak-werk’)</a:t>
             </a:r>
             <a:endParaRPr lang="nl-NL" b="1" dirty="0">
               <a:latin typeface="KPN Sans Light" panose="020B0604020202020204" charset="0"/>
@@ -16671,7 +16613,689 @@
                 <a:tabLst/>
                 <a:defRPr/>
               </a:pPr>
+              <a:t>17</a:t>
+            </a:fld>
+            <a:endParaRPr kumimoji="0" lang="en-GB" sz="800" b="1" i="0" u="none" strike="noStrike" kern="1200" cap="none" spc="0" normalizeH="0" baseline="0" noProof="0" dirty="0">
+              <a:ln>
+                <a:noFill/>
+              </a:ln>
+              <a:solidFill>
+                <a:srgbClr val="009900"/>
+              </a:solidFill>
+              <a:effectLst/>
+              <a:uLnTx/>
+              <a:uFillTx/>
+              <a:latin typeface="KPN Accent"/>
+              <a:ea typeface="+mn-ea"/>
+              <a:cs typeface="+mn-cs"/>
+            </a:endParaRPr>
+          </a:p>
+        </p:txBody>
+      </p:sp>
+      <p:sp>
+        <p:nvSpPr>
+          <p:cNvPr id="7" name="Footer Placeholder 6">
+            <a:extLst>
+              <a:ext uri="{FF2B5EF4-FFF2-40B4-BE49-F238E27FC236}">
+                <a16:creationId xmlns:a16="http://schemas.microsoft.com/office/drawing/2014/main" id="{AB587746-35C8-4627-863E-50A6AAE4BB46}"/>
+              </a:ext>
+            </a:extLst>
+          </p:cNvPr>
+          <p:cNvSpPr>
+            <a:spLocks noGrp="1"/>
+          </p:cNvSpPr>
+          <p:nvPr>
+            <p:ph type="ftr" sz="quarter" idx="3"/>
+          </p:nvPr>
+        </p:nvSpPr>
+        <p:spPr/>
+        <p:txBody>
+          <a:bodyPr/>
+          <a:lstStyle/>
+          <a:p>
+            <a:pPr marL="0" marR="0" lvl="0" indent="0" algn="l" defTabSz="914400" rtl="0" eaLnBrk="1" fontAlgn="auto" latinLnBrk="0" hangingPunct="1">
+              <a:lnSpc>
+                <a:spcPct val="100000"/>
+              </a:lnSpc>
+              <a:spcBef>
+                <a:spcPts val="0"/>
+              </a:spcBef>
+              <a:spcAft>
+                <a:spcPts val="0"/>
+              </a:spcAft>
+              <a:buClrTx/>
+              <a:buSzTx/>
+              <a:buFontTx/>
+              <a:buNone/>
+              <a:tabLst/>
+              <a:defRPr/>
+            </a:pPr>
+            <a:r>
+              <a:rPr kumimoji="0" lang="nl-NL" sz="800" b="0" i="0" u="none" strike="noStrike" kern="1200" cap="none" spc="0" normalizeH="0" baseline="0" noProof="0">
+                <a:ln>
+                  <a:noFill/>
+                </a:ln>
+                <a:solidFill>
+                  <a:srgbClr val="009900"/>
+                </a:solidFill>
+                <a:effectLst/>
+                <a:uLnTx/>
+                <a:uFillTx/>
+                <a:latin typeface="KPN Accent Light" panose="020B0403040000060004" pitchFamily="34" charset="0"/>
+                <a:ea typeface="+mn-ea"/>
+                <a:cs typeface="+mn-cs"/>
+              </a:rPr>
+              <a:t>Marlou Pors</a:t>
+            </a:r>
+            <a:endParaRPr kumimoji="0" lang="nl-NL" sz="800" b="0" i="0" u="none" strike="noStrike" kern="1200" cap="none" spc="0" normalizeH="0" baseline="0" noProof="0" dirty="0">
+              <a:ln>
+                <a:noFill/>
+              </a:ln>
+              <a:solidFill>
+                <a:srgbClr val="009900"/>
+              </a:solidFill>
+              <a:effectLst/>
+              <a:uLnTx/>
+              <a:uFillTx/>
+              <a:latin typeface="KPN Accent Light" panose="020B0403040000060004" pitchFamily="34" charset="0"/>
+              <a:ea typeface="+mn-ea"/>
+              <a:cs typeface="+mn-cs"/>
+            </a:endParaRPr>
+          </a:p>
+        </p:txBody>
+      </p:sp>
+    </p:spTree>
+    <p:extLst>
+      <p:ext uri="{BB962C8B-B14F-4D97-AF65-F5344CB8AC3E}">
+        <p14:creationId xmlns:p14="http://schemas.microsoft.com/office/powerpoint/2010/main" val="2357513955"/>
+      </p:ext>
+    </p:extLst>
+  </p:cSld>
+  <p:clrMapOvr>
+    <a:masterClrMapping/>
+  </p:clrMapOvr>
+</p:sld>
+</file>
+
+<file path=ppt/slides/slide18.xml><?xml version="1.0" encoding="utf-8"?>
+<p:sld xmlns:a="http://schemas.openxmlformats.org/drawingml/2006/main" xmlns:r="http://schemas.openxmlformats.org/officeDocument/2006/relationships" xmlns:p="http://schemas.openxmlformats.org/presentationml/2006/main">
+  <p:cSld>
+    <p:spTree>
+      <p:nvGrpSpPr>
+        <p:cNvPr id="1" name=""/>
+        <p:cNvGrpSpPr/>
+        <p:nvPr/>
+      </p:nvGrpSpPr>
+      <p:grpSpPr>
+        <a:xfrm>
+          <a:off x="0" y="0"/>
+          <a:ext cx="0" cy="0"/>
+          <a:chOff x="0" y="0"/>
+          <a:chExt cx="0" cy="0"/>
+        </a:xfrm>
+      </p:grpSpPr>
+      <p:sp>
+        <p:nvSpPr>
+          <p:cNvPr id="2" name="Title 1">
+            <a:extLst>
+              <a:ext uri="{FF2B5EF4-FFF2-40B4-BE49-F238E27FC236}">
+                <a16:creationId xmlns:a16="http://schemas.microsoft.com/office/drawing/2014/main" id="{66A174C9-9993-42A3-843B-384D4C4138B3}"/>
+              </a:ext>
+            </a:extLst>
+          </p:cNvPr>
+          <p:cNvSpPr>
+            <a:spLocks noGrp="1"/>
+          </p:cNvSpPr>
+          <p:nvPr>
+            <p:ph type="title"/>
+          </p:nvPr>
+        </p:nvSpPr>
+        <p:spPr/>
+        <p:txBody>
+          <a:bodyPr/>
+          <a:lstStyle/>
+          <a:p>
+            <a:r>
+              <a:rPr lang="nl-NL" dirty="0" err="1"/>
+              <a:t>Recap</a:t>
+            </a:r>
+            <a:r>
+              <a:rPr lang="nl-NL" dirty="0"/>
+              <a:t>: SDN in context</a:t>
+            </a:r>
+          </a:p>
+        </p:txBody>
+      </p:sp>
+      <p:sp>
+        <p:nvSpPr>
+          <p:cNvPr id="5" name="Date Placeholder 4">
+            <a:extLst>
+              <a:ext uri="{FF2B5EF4-FFF2-40B4-BE49-F238E27FC236}">
+                <a16:creationId xmlns:a16="http://schemas.microsoft.com/office/drawing/2014/main" id="{7D2F8588-9D49-4498-B5C3-267F332045C9}"/>
+              </a:ext>
+            </a:extLst>
+          </p:cNvPr>
+          <p:cNvSpPr>
+            <a:spLocks noGrp="1"/>
+          </p:cNvSpPr>
+          <p:nvPr>
+            <p:ph type="dt" sz="half" idx="13"/>
+          </p:nvPr>
+        </p:nvSpPr>
+        <p:spPr/>
+        <p:txBody>
+          <a:bodyPr/>
+          <a:lstStyle/>
+          <a:p>
+            <a:pPr>
+              <a:lnSpc>
+                <a:spcPts val="990"/>
+              </a:lnSpc>
+            </a:pPr>
+            <a:r>
+              <a:rPr lang="en-US"/>
+              <a:t>Workshop: Starten met Software Defined Networking</a:t>
+            </a:r>
+            <a:endParaRPr lang="nl-NL" dirty="0"/>
+          </a:p>
+        </p:txBody>
+      </p:sp>
+      <p:sp>
+        <p:nvSpPr>
+          <p:cNvPr id="6" name="Slide Number Placeholder 5">
+            <a:extLst>
+              <a:ext uri="{FF2B5EF4-FFF2-40B4-BE49-F238E27FC236}">
+                <a16:creationId xmlns:a16="http://schemas.microsoft.com/office/drawing/2014/main" id="{0D4933F1-36FF-4460-8F8B-465253D54AFF}"/>
+              </a:ext>
+            </a:extLst>
+          </p:cNvPr>
+          <p:cNvSpPr>
+            <a:spLocks noGrp="1"/>
+          </p:cNvSpPr>
+          <p:nvPr>
+            <p:ph type="sldNum" sz="quarter" idx="15"/>
+          </p:nvPr>
+        </p:nvSpPr>
+        <p:spPr/>
+        <p:txBody>
+          <a:bodyPr/>
+          <a:lstStyle/>
+          <a:p>
+            <a:fld id="{253C79A4-34D5-4A22-8B02-BB0B9B92D27D}" type="slidenum">
+              <a:rPr lang="en-GB" smtClean="0"/>
+              <a:pPr/>
               <a:t>18</a:t>
+            </a:fld>
+            <a:endParaRPr lang="en-GB" dirty="0"/>
+          </a:p>
+        </p:txBody>
+      </p:sp>
+      <p:sp>
+        <p:nvSpPr>
+          <p:cNvPr id="7" name="Footer Placeholder 6">
+            <a:extLst>
+              <a:ext uri="{FF2B5EF4-FFF2-40B4-BE49-F238E27FC236}">
+                <a16:creationId xmlns:a16="http://schemas.microsoft.com/office/drawing/2014/main" id="{EB1DC3A6-F360-4B3B-A292-59C819E6EFED}"/>
+              </a:ext>
+            </a:extLst>
+          </p:cNvPr>
+          <p:cNvSpPr>
+            <a:spLocks noGrp="1"/>
+          </p:cNvSpPr>
+          <p:nvPr>
+            <p:ph type="ftr" sz="quarter" idx="3"/>
+          </p:nvPr>
+        </p:nvSpPr>
+        <p:spPr/>
+        <p:txBody>
+          <a:bodyPr/>
+          <a:lstStyle/>
+          <a:p>
+            <a:r>
+              <a:rPr lang="nl-NL"/>
+              <a:t>Marlou Pors</a:t>
+            </a:r>
+            <a:endParaRPr lang="nl-NL" dirty="0"/>
+          </a:p>
+        </p:txBody>
+      </p:sp>
+      <p:pic>
+        <p:nvPicPr>
+          <p:cNvPr id="13" name="Content Placeholder 12">
+            <a:extLst>
+              <a:ext uri="{FF2B5EF4-FFF2-40B4-BE49-F238E27FC236}">
+                <a16:creationId xmlns:a16="http://schemas.microsoft.com/office/drawing/2014/main" id="{C1D26CE8-E408-4733-A0A2-3C6FD5B55F05}"/>
+              </a:ext>
+            </a:extLst>
+          </p:cNvPr>
+          <p:cNvPicPr>
+            <a:picLocks noGrp="1" noChangeAspect="1"/>
+          </p:cNvPicPr>
+          <p:nvPr>
+            <p:ph idx="1"/>
+          </p:nvPr>
+        </p:nvPicPr>
+        <p:blipFill>
+          <a:blip r:embed="rId2">
+            <a:extLst>
+              <a:ext uri="{28A0092B-C50C-407E-A947-70E740481C1C}">
+                <a14:useLocalDpi xmlns:a14="http://schemas.microsoft.com/office/drawing/2010/main" val="0"/>
+              </a:ext>
+            </a:extLst>
+          </a:blip>
+          <a:stretch>
+            <a:fillRect/>
+          </a:stretch>
+        </p:blipFill>
+        <p:spPr>
+          <a:xfrm>
+            <a:off x="2194124" y="1254125"/>
+            <a:ext cx="4820840" cy="3168650"/>
+          </a:xfrm>
+        </p:spPr>
+      </p:pic>
+    </p:spTree>
+    <p:extLst>
+      <p:ext uri="{BB962C8B-B14F-4D97-AF65-F5344CB8AC3E}">
+        <p14:creationId xmlns:p14="http://schemas.microsoft.com/office/powerpoint/2010/main" val="3887659378"/>
+      </p:ext>
+    </p:extLst>
+  </p:cSld>
+  <p:clrMapOvr>
+    <a:masterClrMapping/>
+  </p:clrMapOvr>
+</p:sld>
+</file>
+
+<file path=ppt/slides/slide19.xml><?xml version="1.0" encoding="utf-8"?>
+<p:sld xmlns:a="http://schemas.openxmlformats.org/drawingml/2006/main" xmlns:r="http://schemas.openxmlformats.org/officeDocument/2006/relationships" xmlns:p="http://schemas.openxmlformats.org/presentationml/2006/main">
+  <p:cSld>
+    <p:spTree>
+      <p:nvGrpSpPr>
+        <p:cNvPr id="1" name=""/>
+        <p:cNvGrpSpPr/>
+        <p:nvPr/>
+      </p:nvGrpSpPr>
+      <p:grpSpPr>
+        <a:xfrm>
+          <a:off x="0" y="0"/>
+          <a:ext cx="0" cy="0"/>
+          <a:chOff x="0" y="0"/>
+          <a:chExt cx="0" cy="0"/>
+        </a:xfrm>
+      </p:grpSpPr>
+      <p:sp>
+        <p:nvSpPr>
+          <p:cNvPr id="2" name="Title 1">
+            <a:extLst>
+              <a:ext uri="{FF2B5EF4-FFF2-40B4-BE49-F238E27FC236}">
+                <a16:creationId xmlns:a16="http://schemas.microsoft.com/office/drawing/2014/main" id="{FABFB207-9643-4CEB-910A-8D043E106A06}"/>
+              </a:ext>
+            </a:extLst>
+          </p:cNvPr>
+          <p:cNvSpPr>
+            <a:spLocks noGrp="1"/>
+          </p:cNvSpPr>
+          <p:nvPr>
+            <p:ph type="title"/>
+          </p:nvPr>
+        </p:nvSpPr>
+        <p:spPr/>
+        <p:txBody>
+          <a:bodyPr/>
+          <a:lstStyle/>
+          <a:p>
+            <a:r>
+              <a:rPr lang="nl-NL" dirty="0"/>
+              <a:t>HANDS-ON 3: </a:t>
+            </a:r>
+            <a:r>
+              <a:rPr lang="nl-NL" dirty="0" err="1"/>
+              <a:t>Intent-based</a:t>
+            </a:r>
+            <a:r>
+              <a:rPr lang="nl-NL" dirty="0"/>
+              <a:t> </a:t>
+            </a:r>
+            <a:r>
+              <a:rPr lang="nl-NL" dirty="0" err="1"/>
+              <a:t>Forwarding</a:t>
+            </a:r>
+            <a:endParaRPr lang="nl-NL" dirty="0"/>
+          </a:p>
+        </p:txBody>
+      </p:sp>
+      <p:sp>
+        <p:nvSpPr>
+          <p:cNvPr id="3" name="Content Placeholder 2">
+            <a:extLst>
+              <a:ext uri="{FF2B5EF4-FFF2-40B4-BE49-F238E27FC236}">
+                <a16:creationId xmlns:a16="http://schemas.microsoft.com/office/drawing/2014/main" id="{D02C0806-BACA-4A10-9F47-4142F6A53A79}"/>
+              </a:ext>
+            </a:extLst>
+          </p:cNvPr>
+          <p:cNvSpPr>
+            <a:spLocks noGrp="1"/>
+          </p:cNvSpPr>
+          <p:nvPr>
+            <p:ph idx="1"/>
+          </p:nvPr>
+        </p:nvSpPr>
+        <p:spPr/>
+        <p:txBody>
+          <a:bodyPr/>
+          <a:lstStyle/>
+          <a:p>
+            <a:r>
+              <a:rPr lang="nl-NL" dirty="0">
+                <a:latin typeface="KPN Sans Light" panose="020B0604020202020204" charset="0"/>
+              </a:rPr>
+              <a:t>Allereerst kleine Demo als voorbeeld</a:t>
+            </a:r>
+          </a:p>
+          <a:p>
+            <a:pPr lvl="1"/>
+            <a:r>
+              <a:rPr lang="nl-NL" dirty="0">
+                <a:latin typeface="KPN Sans Light" panose="020B0604020202020204" charset="0"/>
+              </a:rPr>
+              <a:t>Installeren van een nieuwe applicatie</a:t>
+            </a:r>
+          </a:p>
+          <a:p>
+            <a:pPr lvl="1"/>
+            <a:r>
+              <a:rPr lang="nl-NL" dirty="0" err="1">
+                <a:latin typeface="KPN Sans Light" panose="020B0604020202020204" charset="0"/>
+              </a:rPr>
+              <a:t>Intent-based</a:t>
+            </a:r>
+            <a:r>
+              <a:rPr lang="nl-NL" dirty="0">
+                <a:latin typeface="KPN Sans Light" panose="020B0604020202020204" charset="0"/>
+              </a:rPr>
+              <a:t> </a:t>
+            </a:r>
+            <a:r>
+              <a:rPr lang="nl-NL" dirty="0" err="1">
+                <a:latin typeface="KPN Sans Light" panose="020B0604020202020204" charset="0"/>
+              </a:rPr>
+              <a:t>Forwarding</a:t>
+            </a:r>
+            <a:endParaRPr lang="nl-NL" dirty="0">
+              <a:latin typeface="KPN Sans Light" panose="020B0604020202020204" charset="0"/>
+            </a:endParaRPr>
+          </a:p>
+          <a:p>
+            <a:pPr lvl="1"/>
+            <a:r>
+              <a:rPr lang="nl-NL" dirty="0">
+                <a:latin typeface="KPN Sans Light" panose="020B0604020202020204" charset="0"/>
+              </a:rPr>
+              <a:t>Hoe gaat de controller om met dynamische netwerken</a:t>
+            </a:r>
+          </a:p>
+          <a:p>
+            <a:r>
+              <a:rPr lang="nl-NL" dirty="0">
+                <a:latin typeface="KPN Sans Light" panose="020B0604020202020204" charset="0"/>
+              </a:rPr>
+              <a:t>In de tutorial, werk door:</a:t>
+            </a:r>
+          </a:p>
+          <a:p>
+            <a:pPr lvl="1"/>
+            <a:r>
+              <a:rPr lang="nl-NL" dirty="0">
+                <a:latin typeface="KPN Sans Light" panose="020B0604020202020204" charset="0"/>
+              </a:rPr>
+              <a:t>Next-level SDN: </a:t>
+            </a:r>
+            <a:r>
+              <a:rPr lang="nl-NL" dirty="0" err="1">
+                <a:latin typeface="KPN Sans Light" panose="020B0604020202020204" charset="0"/>
+              </a:rPr>
+              <a:t>Intent-based</a:t>
+            </a:r>
+            <a:r>
+              <a:rPr lang="nl-NL" dirty="0">
+                <a:latin typeface="KPN Sans Light" panose="020B0604020202020204" charset="0"/>
+              </a:rPr>
+              <a:t> </a:t>
+            </a:r>
+            <a:r>
+              <a:rPr lang="nl-NL" dirty="0" err="1">
+                <a:latin typeface="KPN Sans Light" panose="020B0604020202020204" charset="0"/>
+              </a:rPr>
+              <a:t>Forwarding</a:t>
+            </a:r>
+            <a:endParaRPr lang="nl-NL" dirty="0">
+              <a:latin typeface="KPN Sans Light" panose="020B0604020202020204" charset="0"/>
+            </a:endParaRPr>
+          </a:p>
+          <a:p>
+            <a:pPr lvl="1"/>
+            <a:r>
+              <a:rPr lang="nl-NL" b="1" dirty="0">
+                <a:latin typeface="KPN Sans Light" panose="020B0604020202020204" charset="0"/>
+              </a:rPr>
+              <a:t>(Bonus) </a:t>
+            </a:r>
+            <a:r>
+              <a:rPr lang="nl-NL" dirty="0">
+                <a:latin typeface="KPN Sans Light" panose="020B0604020202020204" charset="0"/>
+              </a:rPr>
+              <a:t>“</a:t>
+            </a:r>
+            <a:r>
+              <a:rPr lang="nl-NL" dirty="0" err="1">
+                <a:latin typeface="KPN Sans Light" panose="020B0604020202020204" charset="0"/>
+              </a:rPr>
+              <a:t>Try</a:t>
+            </a:r>
+            <a:r>
+              <a:rPr lang="nl-NL" dirty="0">
+                <a:latin typeface="KPN Sans Light" panose="020B0604020202020204" charset="0"/>
+              </a:rPr>
+              <a:t> </a:t>
+            </a:r>
+            <a:r>
+              <a:rPr lang="nl-NL" dirty="0" err="1">
+                <a:latin typeface="KPN Sans Light" panose="020B0604020202020204" charset="0"/>
+              </a:rPr>
+              <a:t>it</a:t>
+            </a:r>
+            <a:r>
+              <a:rPr lang="nl-NL" dirty="0">
+                <a:latin typeface="KPN Sans Light" panose="020B0604020202020204" charset="0"/>
+              </a:rPr>
+              <a:t> </a:t>
+            </a:r>
+            <a:r>
+              <a:rPr lang="nl-NL" dirty="0" err="1">
+                <a:latin typeface="KPN Sans Light" panose="020B0604020202020204" charset="0"/>
+              </a:rPr>
+              <a:t>all</a:t>
+            </a:r>
+            <a:r>
+              <a:rPr lang="nl-NL" dirty="0">
+                <a:latin typeface="KPN Sans Light" panose="020B0604020202020204" charset="0"/>
+              </a:rPr>
+              <a:t>” opgave</a:t>
+            </a:r>
+            <a:endParaRPr lang="nl-NL" b="1" dirty="0">
+              <a:latin typeface="KPN Sans Light" panose="020B0604020202020204" charset="0"/>
+            </a:endParaRPr>
+          </a:p>
+          <a:p>
+            <a:pPr lvl="1"/>
+            <a:endParaRPr lang="nl-NL" b="1" dirty="0">
+              <a:latin typeface="KPN Sans Light" panose="020B0604020202020204" charset="0"/>
+            </a:endParaRPr>
+          </a:p>
+          <a:p>
+            <a:r>
+              <a:rPr lang="nl-NL" b="1" dirty="0">
+                <a:latin typeface="KPN Sans Light" panose="020B0604020202020204" charset="0"/>
+              </a:rPr>
+              <a:t>Workshopmateriaal via: </a:t>
+            </a:r>
+            <a:r>
+              <a:rPr lang="nl-NL" dirty="0">
+                <a:latin typeface="KPN Sans Light" panose="020B0604020202020204" charset="0"/>
+                <a:hlinkClick r:id="rId2"/>
+              </a:rPr>
+              <a:t>www.github.com/Marlou16/sdn-tutorial</a:t>
+            </a:r>
+            <a:endParaRPr lang="nl-NL" b="1" dirty="0">
+              <a:latin typeface="KPN Sans Light" panose="020B0604020202020204" charset="0"/>
+            </a:endParaRPr>
+          </a:p>
+        </p:txBody>
+      </p:sp>
+      <p:sp>
+        <p:nvSpPr>
+          <p:cNvPr id="5" name="Date Placeholder 4">
+            <a:extLst>
+              <a:ext uri="{FF2B5EF4-FFF2-40B4-BE49-F238E27FC236}">
+                <a16:creationId xmlns:a16="http://schemas.microsoft.com/office/drawing/2014/main" id="{BB67C49F-D0AF-48F2-BC5F-4CB884C21EF3}"/>
+              </a:ext>
+            </a:extLst>
+          </p:cNvPr>
+          <p:cNvSpPr>
+            <a:spLocks noGrp="1"/>
+          </p:cNvSpPr>
+          <p:nvPr>
+            <p:ph type="dt" sz="half" idx="13"/>
+          </p:nvPr>
+        </p:nvSpPr>
+        <p:spPr/>
+        <p:txBody>
+          <a:bodyPr/>
+          <a:lstStyle/>
+          <a:p>
+            <a:pPr marL="0" marR="0" lvl="0" indent="0" algn="l" defTabSz="914400" rtl="0" eaLnBrk="1" fontAlgn="auto" latinLnBrk="0" hangingPunct="1">
+              <a:lnSpc>
+                <a:spcPts val="990"/>
+              </a:lnSpc>
+              <a:spcBef>
+                <a:spcPts val="0"/>
+              </a:spcBef>
+              <a:spcAft>
+                <a:spcPts val="0"/>
+              </a:spcAft>
+              <a:buClrTx/>
+              <a:buSzTx/>
+              <a:buFontTx/>
+              <a:buNone/>
+              <a:tabLst/>
+              <a:defRPr/>
+            </a:pPr>
+            <a:r>
+              <a:rPr kumimoji="0" lang="en-US" sz="800" b="0" i="0" u="none" strike="noStrike" kern="1200" cap="none" spc="0" normalizeH="0" baseline="0" noProof="0">
+                <a:ln>
+                  <a:noFill/>
+                </a:ln>
+                <a:solidFill>
+                  <a:srgbClr val="009900"/>
+                </a:solidFill>
+                <a:effectLst/>
+                <a:uLnTx/>
+                <a:uFillTx/>
+                <a:latin typeface="KPN Accent Light" panose="020B0403040000060004" pitchFamily="34" charset="0"/>
+                <a:ea typeface="+mn-ea"/>
+                <a:cs typeface="+mn-cs"/>
+              </a:rPr>
+              <a:t>Workshop: Starten met Software Defined Networking</a:t>
+            </a:r>
+            <a:endParaRPr kumimoji="0" lang="nl-NL" sz="800" b="0" i="0" u="none" strike="noStrike" kern="1200" cap="none" spc="0" normalizeH="0" baseline="0" noProof="0" dirty="0">
+              <a:ln>
+                <a:noFill/>
+              </a:ln>
+              <a:solidFill>
+                <a:srgbClr val="009900"/>
+              </a:solidFill>
+              <a:effectLst/>
+              <a:uLnTx/>
+              <a:uFillTx/>
+              <a:latin typeface="KPN Accent Light" panose="020B0403040000060004" pitchFamily="34" charset="0"/>
+              <a:ea typeface="+mn-ea"/>
+              <a:cs typeface="+mn-cs"/>
+            </a:endParaRPr>
+          </a:p>
+        </p:txBody>
+      </p:sp>
+      <p:sp>
+        <p:nvSpPr>
+          <p:cNvPr id="6" name="Slide Number Placeholder 5">
+            <a:extLst>
+              <a:ext uri="{FF2B5EF4-FFF2-40B4-BE49-F238E27FC236}">
+                <a16:creationId xmlns:a16="http://schemas.microsoft.com/office/drawing/2014/main" id="{7D328F17-81D2-403D-8D18-0A005370FDF0}"/>
+              </a:ext>
+            </a:extLst>
+          </p:cNvPr>
+          <p:cNvSpPr>
+            <a:spLocks noGrp="1"/>
+          </p:cNvSpPr>
+          <p:nvPr>
+            <p:ph type="sldNum" sz="quarter" idx="15"/>
+          </p:nvPr>
+        </p:nvSpPr>
+        <p:spPr/>
+        <p:txBody>
+          <a:bodyPr/>
+          <a:lstStyle/>
+          <a:p>
+            <a:pPr marL="0" marR="0" lvl="0" indent="0" algn="l" defTabSz="914400" rtl="0" eaLnBrk="1" fontAlgn="auto" latinLnBrk="0" hangingPunct="1">
+              <a:lnSpc>
+                <a:spcPts val="990"/>
+              </a:lnSpc>
+              <a:spcBef>
+                <a:spcPts val="0"/>
+              </a:spcBef>
+              <a:spcAft>
+                <a:spcPts val="0"/>
+              </a:spcAft>
+              <a:buClrTx/>
+              <a:buSzTx/>
+              <a:buFontTx/>
+              <a:buNone/>
+              <a:tabLst/>
+              <a:defRPr/>
+            </a:pPr>
+            <a:fld id="{253C79A4-34D5-4A22-8B02-BB0B9B92D27D}" type="slidenum">
+              <a:rPr kumimoji="0" lang="en-GB" sz="800" b="1" i="0" u="none" strike="noStrike" kern="1200" cap="none" spc="0" normalizeH="0" baseline="0" noProof="0" smtClean="0">
+                <a:ln>
+                  <a:noFill/>
+                </a:ln>
+                <a:solidFill>
+                  <a:srgbClr val="009900"/>
+                </a:solidFill>
+                <a:effectLst/>
+                <a:uLnTx/>
+                <a:uFillTx/>
+                <a:latin typeface="KPN Accent"/>
+                <a:ea typeface="+mn-ea"/>
+                <a:cs typeface="+mn-cs"/>
+              </a:rPr>
+              <a:pPr marL="0" marR="0" lvl="0" indent="0" algn="l" defTabSz="914400" rtl="0" eaLnBrk="1" fontAlgn="auto" latinLnBrk="0" hangingPunct="1">
+                <a:lnSpc>
+                  <a:spcPts val="990"/>
+                </a:lnSpc>
+                <a:spcBef>
+                  <a:spcPts val="0"/>
+                </a:spcBef>
+                <a:spcAft>
+                  <a:spcPts val="0"/>
+                </a:spcAft>
+                <a:buClrTx/>
+                <a:buSzTx/>
+                <a:buFontTx/>
+                <a:buNone/>
+                <a:tabLst/>
+                <a:defRPr/>
+              </a:pPr>
+              <a:t>19</a:t>
             </a:fld>
             <a:endParaRPr kumimoji="0" lang="en-GB" sz="800" b="1" i="0" u="none" strike="noStrike" kern="1200" cap="none" spc="0" normalizeH="0" baseline="0" noProof="0" dirty="0">
               <a:ln>
@@ -18647,6 +19271,310 @@
           <p:cNvPr id="2" name="Title 1">
             <a:extLst>
               <a:ext uri="{FF2B5EF4-FFF2-40B4-BE49-F238E27FC236}">
+                <a16:creationId xmlns:a16="http://schemas.microsoft.com/office/drawing/2014/main" id="{8ED6269E-AC71-48D1-A02E-7023C592803C}"/>
+              </a:ext>
+            </a:extLst>
+          </p:cNvPr>
+          <p:cNvSpPr>
+            <a:spLocks noGrp="1"/>
+          </p:cNvSpPr>
+          <p:nvPr>
+            <p:ph type="title"/>
+          </p:nvPr>
+        </p:nvSpPr>
+        <p:spPr/>
+        <p:txBody>
+          <a:bodyPr/>
+          <a:lstStyle/>
+          <a:p>
+            <a:r>
+              <a:rPr lang="nl-NL" dirty="0"/>
+              <a:t>Mogelijkheden met SDN</a:t>
+            </a:r>
+          </a:p>
+        </p:txBody>
+      </p:sp>
+      <p:sp>
+        <p:nvSpPr>
+          <p:cNvPr id="3" name="Content Placeholder 2">
+            <a:extLst>
+              <a:ext uri="{FF2B5EF4-FFF2-40B4-BE49-F238E27FC236}">
+                <a16:creationId xmlns:a16="http://schemas.microsoft.com/office/drawing/2014/main" id="{0F572B69-2D50-450E-8553-0C45CF67A2A1}"/>
+              </a:ext>
+            </a:extLst>
+          </p:cNvPr>
+          <p:cNvSpPr>
+            <a:spLocks noGrp="1"/>
+          </p:cNvSpPr>
+          <p:nvPr>
+            <p:ph idx="1"/>
+          </p:nvPr>
+        </p:nvSpPr>
+        <p:spPr/>
+        <p:txBody>
+          <a:bodyPr/>
+          <a:lstStyle/>
+          <a:p>
+            <a:r>
+              <a:rPr lang="nl-NL" dirty="0">
+                <a:latin typeface="+mn-lt"/>
+              </a:rPr>
+              <a:t>Netwerkapparatuur wordt ‘simpeler’, en daarmee goedkoper</a:t>
+            </a:r>
+          </a:p>
+          <a:p>
+            <a:r>
+              <a:rPr lang="nl-NL" dirty="0">
+                <a:latin typeface="+mn-lt"/>
+              </a:rPr>
+              <a:t>Netwerkfunctionaliteit wordt van bovenaf bestuurd</a:t>
+            </a:r>
+          </a:p>
+          <a:p>
+            <a:pPr lvl="1"/>
+            <a:r>
+              <a:rPr lang="nl-NL" dirty="0">
+                <a:latin typeface="+mn-lt"/>
+              </a:rPr>
+              <a:t>Meer inzicht in het netwerk</a:t>
+            </a:r>
+          </a:p>
+          <a:p>
+            <a:pPr lvl="1"/>
+            <a:r>
+              <a:rPr lang="nl-NL" dirty="0">
+                <a:latin typeface="+mn-lt"/>
+              </a:rPr>
+              <a:t>Minder afhankelijk van netwerkapparatuur (zogenaamde </a:t>
+            </a:r>
+            <a:r>
+              <a:rPr lang="nl-NL" dirty="0" err="1">
+                <a:latin typeface="+mn-lt"/>
+              </a:rPr>
+              <a:t>blackboxes</a:t>
+            </a:r>
+            <a:r>
+              <a:rPr lang="nl-NL" dirty="0">
+                <a:latin typeface="+mn-lt"/>
+              </a:rPr>
+              <a:t>)</a:t>
+            </a:r>
+          </a:p>
+          <a:p>
+            <a:r>
+              <a:rPr lang="nl-NL" dirty="0">
+                <a:latin typeface="+mn-lt"/>
+              </a:rPr>
+              <a:t>We kunnen zelf netwerkfunctionaliteit programmeren</a:t>
+            </a:r>
+          </a:p>
+          <a:p>
+            <a:endParaRPr lang="nl-NL" dirty="0">
+              <a:latin typeface="+mn-lt"/>
+            </a:endParaRPr>
+          </a:p>
+          <a:p>
+            <a:pPr marL="0" indent="0">
+              <a:buNone/>
+            </a:pPr>
+            <a:r>
+              <a:rPr lang="nl-NL" b="1" dirty="0">
+                <a:solidFill>
+                  <a:srgbClr val="009900"/>
+                </a:solidFill>
+                <a:latin typeface="+mn-lt"/>
+              </a:rPr>
+              <a:t>@KPN</a:t>
+            </a:r>
+          </a:p>
+          <a:p>
+            <a:pPr marL="0" indent="0">
+              <a:buNone/>
+            </a:pPr>
+            <a:r>
+              <a:rPr lang="nl-NL" dirty="0">
+                <a:latin typeface="+mn-lt"/>
+              </a:rPr>
+              <a:t>We willen het traditionele </a:t>
+            </a:r>
+            <a:r>
+              <a:rPr lang="nl-NL" dirty="0" err="1">
+                <a:latin typeface="+mn-lt"/>
+              </a:rPr>
+              <a:t>core</a:t>
+            </a:r>
+            <a:r>
+              <a:rPr lang="nl-NL" dirty="0">
+                <a:latin typeface="+mn-lt"/>
+              </a:rPr>
+              <a:t> netwerk vervangen voor een SDN;</a:t>
+            </a:r>
+          </a:p>
+          <a:p>
+            <a:pPr marL="0" indent="0">
+              <a:buNone/>
+            </a:pPr>
+            <a:r>
+              <a:rPr lang="nl-NL" dirty="0">
+                <a:latin typeface="+mn-lt"/>
+              </a:rPr>
+              <a:t>Het </a:t>
+            </a:r>
+            <a:r>
+              <a:rPr lang="nl-NL" dirty="0" err="1">
+                <a:latin typeface="+mn-lt"/>
+              </a:rPr>
+              <a:t>GOVirtual</a:t>
+            </a:r>
+            <a:r>
+              <a:rPr lang="nl-NL" dirty="0">
+                <a:latin typeface="+mn-lt"/>
+              </a:rPr>
+              <a:t> platform heeft ook een SDN structuur met “</a:t>
+            </a:r>
+            <a:r>
+              <a:rPr lang="nl-NL" dirty="0" err="1">
+                <a:latin typeface="+mn-lt"/>
+              </a:rPr>
+              <a:t>Nuage</a:t>
+            </a:r>
+            <a:r>
+              <a:rPr lang="nl-NL" dirty="0">
+                <a:latin typeface="+mn-lt"/>
+              </a:rPr>
+              <a:t>”.</a:t>
+            </a:r>
+          </a:p>
+        </p:txBody>
+      </p:sp>
+      <p:sp>
+        <p:nvSpPr>
+          <p:cNvPr id="5" name="Date Placeholder 4">
+            <a:extLst>
+              <a:ext uri="{FF2B5EF4-FFF2-40B4-BE49-F238E27FC236}">
+                <a16:creationId xmlns:a16="http://schemas.microsoft.com/office/drawing/2014/main" id="{336A3723-31A4-4F06-B090-E14FB34F7DB1}"/>
+              </a:ext>
+            </a:extLst>
+          </p:cNvPr>
+          <p:cNvSpPr>
+            <a:spLocks noGrp="1"/>
+          </p:cNvSpPr>
+          <p:nvPr>
+            <p:ph type="dt" sz="half" idx="13"/>
+          </p:nvPr>
+        </p:nvSpPr>
+        <p:spPr/>
+        <p:txBody>
+          <a:bodyPr/>
+          <a:lstStyle/>
+          <a:p>
+            <a:pPr>
+              <a:lnSpc>
+                <a:spcPts val="990"/>
+              </a:lnSpc>
+            </a:pPr>
+            <a:r>
+              <a:rPr lang="en-US"/>
+              <a:t>Workshop: Starten met Software Defined Networking</a:t>
+            </a:r>
+            <a:endParaRPr lang="nl-NL" dirty="0"/>
+          </a:p>
+        </p:txBody>
+      </p:sp>
+      <p:sp>
+        <p:nvSpPr>
+          <p:cNvPr id="6" name="Slide Number Placeholder 5">
+            <a:extLst>
+              <a:ext uri="{FF2B5EF4-FFF2-40B4-BE49-F238E27FC236}">
+                <a16:creationId xmlns:a16="http://schemas.microsoft.com/office/drawing/2014/main" id="{F463B3CE-7619-4E18-A574-E0C9E41FCDD1}"/>
+              </a:ext>
+            </a:extLst>
+          </p:cNvPr>
+          <p:cNvSpPr>
+            <a:spLocks noGrp="1"/>
+          </p:cNvSpPr>
+          <p:nvPr>
+            <p:ph type="sldNum" sz="quarter" idx="15"/>
+          </p:nvPr>
+        </p:nvSpPr>
+        <p:spPr/>
+        <p:txBody>
+          <a:bodyPr/>
+          <a:lstStyle/>
+          <a:p>
+            <a:fld id="{253C79A4-34D5-4A22-8B02-BB0B9B92D27D}" type="slidenum">
+              <a:rPr lang="en-GB" smtClean="0"/>
+              <a:pPr/>
+              <a:t>6</a:t>
+            </a:fld>
+            <a:endParaRPr lang="en-GB" dirty="0"/>
+          </a:p>
+        </p:txBody>
+      </p:sp>
+      <p:sp>
+        <p:nvSpPr>
+          <p:cNvPr id="7" name="Footer Placeholder 6">
+            <a:extLst>
+              <a:ext uri="{FF2B5EF4-FFF2-40B4-BE49-F238E27FC236}">
+                <a16:creationId xmlns:a16="http://schemas.microsoft.com/office/drawing/2014/main" id="{8D9B9BC8-6DF2-4C13-A229-DEB5688F8426}"/>
+              </a:ext>
+            </a:extLst>
+          </p:cNvPr>
+          <p:cNvSpPr>
+            <a:spLocks noGrp="1"/>
+          </p:cNvSpPr>
+          <p:nvPr>
+            <p:ph type="ftr" sz="quarter" idx="3"/>
+          </p:nvPr>
+        </p:nvSpPr>
+        <p:spPr/>
+        <p:txBody>
+          <a:bodyPr/>
+          <a:lstStyle/>
+          <a:p>
+            <a:r>
+              <a:rPr lang="nl-NL"/>
+              <a:t>Marlou Pors</a:t>
+            </a:r>
+            <a:endParaRPr lang="nl-NL" dirty="0"/>
+          </a:p>
+        </p:txBody>
+      </p:sp>
+    </p:spTree>
+    <p:extLst>
+      <p:ext uri="{BB962C8B-B14F-4D97-AF65-F5344CB8AC3E}">
+        <p14:creationId xmlns:p14="http://schemas.microsoft.com/office/powerpoint/2010/main" val="1727440058"/>
+      </p:ext>
+    </p:extLst>
+  </p:cSld>
+  <p:clrMapOvr>
+    <a:masterClrMapping/>
+  </p:clrMapOvr>
+</p:sld>
+</file>
+
+<file path=ppt/slides/slide7.xml><?xml version="1.0" encoding="utf-8"?>
+<p:sld xmlns:a="http://schemas.openxmlformats.org/drawingml/2006/main" xmlns:r="http://schemas.openxmlformats.org/officeDocument/2006/relationships" xmlns:p="http://schemas.openxmlformats.org/presentationml/2006/main">
+  <p:cSld>
+    <p:spTree>
+      <p:nvGrpSpPr>
+        <p:cNvPr id="1" name=""/>
+        <p:cNvGrpSpPr/>
+        <p:nvPr/>
+      </p:nvGrpSpPr>
+      <p:grpSpPr>
+        <a:xfrm>
+          <a:off x="0" y="0"/>
+          <a:ext cx="0" cy="0"/>
+          <a:chOff x="0" y="0"/>
+          <a:chExt cx="0" cy="0"/>
+        </a:xfrm>
+      </p:grpSpPr>
+      <p:sp>
+        <p:nvSpPr>
+          <p:cNvPr id="2" name="Title 1">
+            <a:extLst>
+              <a:ext uri="{FF2B5EF4-FFF2-40B4-BE49-F238E27FC236}">
                 <a16:creationId xmlns:a16="http://schemas.microsoft.com/office/drawing/2014/main" id="{64FE906F-0B0C-486E-8A4C-5D9D62206A64}"/>
               </a:ext>
             </a:extLst>
@@ -18820,7 +19748,7 @@
                 <a:tabLst/>
                 <a:defRPr/>
               </a:pPr>
-              <a:t>6</a:t>
+              <a:t>7</a:t>
             </a:fld>
             <a:endParaRPr kumimoji="0" lang="en-GB" sz="800" b="1" i="0" u="none" strike="noStrike" kern="1200" cap="none" spc="0" normalizeH="0" baseline="0" noProof="0" dirty="0">
               <a:ln>
@@ -20082,7 +21010,7 @@
 </p:sld>
 </file>
 
-<file path=ppt/slides/slide7.xml><?xml version="1.0" encoding="utf-8"?>
+<file path=ppt/slides/slide8.xml><?xml version="1.0" encoding="utf-8"?>
 <p:sld xmlns:a="http://schemas.openxmlformats.org/drawingml/2006/main" xmlns:r="http://schemas.openxmlformats.org/officeDocument/2006/relationships" xmlns:p="http://schemas.openxmlformats.org/presentationml/2006/main">
   <p:cSld>
     <p:spTree>
@@ -20277,7 +21205,7 @@
                 <a:tabLst/>
                 <a:defRPr/>
               </a:pPr>
-              <a:t>7</a:t>
+              <a:t>8</a:t>
             </a:fld>
             <a:endParaRPr kumimoji="0" lang="en-GB" sz="800" b="1" i="0" u="none" strike="noStrike" kern="1200" cap="none" spc="0" normalizeH="0" baseline="0" noProof="0" dirty="0">
               <a:ln>
@@ -20636,6 +21564,42 @@
           </a:fontRef>
         </p:style>
       </p:cxnSp>
+      <p:pic>
+        <p:nvPicPr>
+          <p:cNvPr id="10" name="Picture 9">
+            <a:extLst>
+              <a:ext uri="{FF2B5EF4-FFF2-40B4-BE49-F238E27FC236}">
+                <a16:creationId xmlns:a16="http://schemas.microsoft.com/office/drawing/2014/main" id="{354C86B2-29E2-428E-BFB8-6C5CA613C3F3}"/>
+              </a:ext>
+            </a:extLst>
+          </p:cNvPr>
+          <p:cNvPicPr>
+            <a:picLocks noChangeAspect="1"/>
+          </p:cNvPicPr>
+          <p:nvPr/>
+        </p:nvPicPr>
+        <p:blipFill>
+          <a:blip r:embed="rId5" cstate="print">
+            <a:extLst>
+              <a:ext uri="{28A0092B-C50C-407E-A947-70E740481C1C}">
+                <a14:useLocalDpi xmlns:a14="http://schemas.microsoft.com/office/drawing/2010/main" val="0"/>
+              </a:ext>
+            </a:extLst>
+          </a:blip>
+          <a:stretch>
+            <a:fillRect/>
+          </a:stretch>
+        </p:blipFill>
+        <p:spPr>
+          <a:xfrm>
+            <a:off x="6418790" y="468058"/>
+            <a:ext cx="1376246" cy="688123"/>
+          </a:xfrm>
+          <a:prstGeom prst="rect">
+            <a:avLst/>
+          </a:prstGeom>
+        </p:spPr>
+      </p:pic>
     </p:spTree>
     <p:extLst>
       <p:ext uri="{BB962C8B-B14F-4D97-AF65-F5344CB8AC3E}">
@@ -20649,7 +21613,7 @@
 </p:sld>
 </file>
 
-<file path=ppt/slides/slide8.xml><?xml version="1.0" encoding="utf-8"?>
+<file path=ppt/slides/slide9.xml><?xml version="1.0" encoding="utf-8"?>
 <p:sld xmlns:a="http://schemas.openxmlformats.org/drawingml/2006/main" xmlns:r="http://schemas.openxmlformats.org/officeDocument/2006/relationships" xmlns:p="http://schemas.openxmlformats.org/presentationml/2006/main">
   <p:cSld>
     <p:spTree>
@@ -20752,7 +21716,7 @@
             <a:fld id="{253C79A4-34D5-4A22-8B02-BB0B9B92D27D}" type="slidenum">
               <a:rPr lang="en-GB" smtClean="0"/>
               <a:pPr/>
-              <a:t>8</a:t>
+              <a:t>9</a:t>
             </a:fld>
             <a:endParaRPr lang="en-GB" dirty="0"/>
           </a:p>
@@ -20901,625 +21865,6 @@
     <p:extLst>
       <p:ext uri="{BB962C8B-B14F-4D97-AF65-F5344CB8AC3E}">
         <p14:creationId xmlns:p14="http://schemas.microsoft.com/office/powerpoint/2010/main" val="1414092209"/>
-      </p:ext>
-    </p:extLst>
-  </p:cSld>
-  <p:clrMapOvr>
-    <a:masterClrMapping/>
-  </p:clrMapOvr>
-</p:sld>
-</file>
-
-<file path=ppt/slides/slide9.xml><?xml version="1.0" encoding="utf-8"?>
-<p:sld xmlns:a="http://schemas.openxmlformats.org/drawingml/2006/main" xmlns:r="http://schemas.openxmlformats.org/officeDocument/2006/relationships" xmlns:p="http://schemas.openxmlformats.org/presentationml/2006/main">
-  <p:cSld>
-    <p:spTree>
-      <p:nvGrpSpPr>
-        <p:cNvPr id="1" name=""/>
-        <p:cNvGrpSpPr/>
-        <p:nvPr/>
-      </p:nvGrpSpPr>
-      <p:grpSpPr>
-        <a:xfrm>
-          <a:off x="0" y="0"/>
-          <a:ext cx="0" cy="0"/>
-          <a:chOff x="0" y="0"/>
-          <a:chExt cx="0" cy="0"/>
-        </a:xfrm>
-      </p:grpSpPr>
-      <p:sp>
-        <p:nvSpPr>
-          <p:cNvPr id="2" name="Title 1">
-            <a:extLst>
-              <a:ext uri="{FF2B5EF4-FFF2-40B4-BE49-F238E27FC236}">
-                <a16:creationId xmlns:a16="http://schemas.microsoft.com/office/drawing/2014/main" id="{9285FEAD-81E3-49EB-BC97-6BADD4F10646}"/>
-              </a:ext>
-            </a:extLst>
-          </p:cNvPr>
-          <p:cNvSpPr>
-            <a:spLocks noGrp="1"/>
-          </p:cNvSpPr>
-          <p:nvPr>
-            <p:ph type="title"/>
-          </p:nvPr>
-        </p:nvSpPr>
-        <p:spPr/>
-        <p:txBody>
-          <a:bodyPr/>
-          <a:lstStyle/>
-          <a:p>
-            <a:r>
-              <a:rPr lang="nl-NL" dirty="0"/>
-              <a:t>Communicatie in een traditioneel netwerk (2)</a:t>
-            </a:r>
-          </a:p>
-        </p:txBody>
-      </p:sp>
-      <p:sp>
-        <p:nvSpPr>
-          <p:cNvPr id="5" name="Date Placeholder 4">
-            <a:extLst>
-              <a:ext uri="{FF2B5EF4-FFF2-40B4-BE49-F238E27FC236}">
-                <a16:creationId xmlns:a16="http://schemas.microsoft.com/office/drawing/2014/main" id="{0B30BD42-E635-4819-A9F9-7BBA15C2634F}"/>
-              </a:ext>
-            </a:extLst>
-          </p:cNvPr>
-          <p:cNvSpPr>
-            <a:spLocks noGrp="1"/>
-          </p:cNvSpPr>
-          <p:nvPr>
-            <p:ph type="dt" sz="half" idx="13"/>
-          </p:nvPr>
-        </p:nvSpPr>
-        <p:spPr/>
-        <p:txBody>
-          <a:bodyPr/>
-          <a:lstStyle/>
-          <a:p>
-            <a:pPr>
-              <a:lnSpc>
-                <a:spcPts val="990"/>
-              </a:lnSpc>
-            </a:pPr>
-            <a:r>
-              <a:rPr lang="en-US"/>
-              <a:t>Workshop: Starten met Software Defined Networking</a:t>
-            </a:r>
-            <a:endParaRPr lang="nl-NL" dirty="0"/>
-          </a:p>
-        </p:txBody>
-      </p:sp>
-      <p:sp>
-        <p:nvSpPr>
-          <p:cNvPr id="6" name="Slide Number Placeholder 5">
-            <a:extLst>
-              <a:ext uri="{FF2B5EF4-FFF2-40B4-BE49-F238E27FC236}">
-                <a16:creationId xmlns:a16="http://schemas.microsoft.com/office/drawing/2014/main" id="{797EA126-818C-44F7-B7D5-35C66D690922}"/>
-              </a:ext>
-            </a:extLst>
-          </p:cNvPr>
-          <p:cNvSpPr>
-            <a:spLocks noGrp="1"/>
-          </p:cNvSpPr>
-          <p:nvPr>
-            <p:ph type="sldNum" sz="quarter" idx="15"/>
-          </p:nvPr>
-        </p:nvSpPr>
-        <p:spPr/>
-        <p:txBody>
-          <a:bodyPr/>
-          <a:lstStyle/>
-          <a:p>
-            <a:fld id="{253C79A4-34D5-4A22-8B02-BB0B9B92D27D}" type="slidenum">
-              <a:rPr lang="en-GB" smtClean="0"/>
-              <a:pPr/>
-              <a:t>9</a:t>
-            </a:fld>
-            <a:endParaRPr lang="en-GB" dirty="0"/>
-          </a:p>
-        </p:txBody>
-      </p:sp>
-      <p:sp>
-        <p:nvSpPr>
-          <p:cNvPr id="7" name="Footer Placeholder 6">
-            <a:extLst>
-              <a:ext uri="{FF2B5EF4-FFF2-40B4-BE49-F238E27FC236}">
-                <a16:creationId xmlns:a16="http://schemas.microsoft.com/office/drawing/2014/main" id="{8CF9EF63-6D3A-45DC-9183-B93FC38D31C4}"/>
-              </a:ext>
-            </a:extLst>
-          </p:cNvPr>
-          <p:cNvSpPr>
-            <a:spLocks noGrp="1"/>
-          </p:cNvSpPr>
-          <p:nvPr>
-            <p:ph type="ftr" sz="quarter" idx="3"/>
-          </p:nvPr>
-        </p:nvSpPr>
-        <p:spPr/>
-        <p:txBody>
-          <a:bodyPr/>
-          <a:lstStyle/>
-          <a:p>
-            <a:r>
-              <a:rPr lang="nl-NL"/>
-              <a:t>Marlou Pors</a:t>
-            </a:r>
-            <a:endParaRPr lang="nl-NL" dirty="0"/>
-          </a:p>
-        </p:txBody>
-      </p:sp>
-      <p:pic>
-        <p:nvPicPr>
-          <p:cNvPr id="8" name="Picture 7">
-            <a:extLst>
-              <a:ext uri="{FF2B5EF4-FFF2-40B4-BE49-F238E27FC236}">
-                <a16:creationId xmlns:a16="http://schemas.microsoft.com/office/drawing/2014/main" id="{9E0F9F15-5290-4956-9659-719F9C878877}"/>
-              </a:ext>
-            </a:extLst>
-          </p:cNvPr>
-          <p:cNvPicPr>
-            <a:picLocks noChangeAspect="1"/>
-          </p:cNvPicPr>
-          <p:nvPr/>
-        </p:nvPicPr>
-        <p:blipFill>
-          <a:blip r:embed="rId2"/>
-          <a:stretch>
-            <a:fillRect/>
-          </a:stretch>
-        </p:blipFill>
-        <p:spPr>
-          <a:xfrm>
-            <a:off x="1827379" y="1920130"/>
-            <a:ext cx="5563082" cy="2522439"/>
-          </a:xfrm>
-          <a:prstGeom prst="rect">
-            <a:avLst/>
-          </a:prstGeom>
-        </p:spPr>
-      </p:pic>
-      <p:sp>
-        <p:nvSpPr>
-          <p:cNvPr id="19" name="Toelichting met afgeronde rechthoek 5">
-            <a:extLst>
-              <a:ext uri="{FF2B5EF4-FFF2-40B4-BE49-F238E27FC236}">
-                <a16:creationId xmlns:a16="http://schemas.microsoft.com/office/drawing/2014/main" id="{4361040E-2DFE-4318-9389-CB83C5C5449A}"/>
-              </a:ext>
-            </a:extLst>
-          </p:cNvPr>
-          <p:cNvSpPr/>
-          <p:nvPr/>
-        </p:nvSpPr>
-        <p:spPr>
-          <a:xfrm>
-            <a:off x="1827379" y="1505880"/>
-            <a:ext cx="1423554" cy="827126"/>
-          </a:xfrm>
-          <a:prstGeom prst="wedgeRoundRectCallout">
-            <a:avLst/>
-          </a:prstGeom>
-          <a:noFill/>
-        </p:spPr>
-        <p:style>
-          <a:lnRef idx="1">
-            <a:schemeClr val="accent1"/>
-          </a:lnRef>
-          <a:fillRef idx="3">
-            <a:schemeClr val="accent1"/>
-          </a:fillRef>
-          <a:effectRef idx="2">
-            <a:schemeClr val="accent1"/>
-          </a:effectRef>
-          <a:fontRef idx="minor">
-            <a:schemeClr val="lt1"/>
-          </a:fontRef>
-        </p:style>
-        <p:txBody>
-          <a:bodyPr rtlCol="0" anchor="ctr"/>
-          <a:lstStyle/>
-          <a:p>
-            <a:pPr algn="ctr"/>
-            <a:endParaRPr lang="nl-NL"/>
-          </a:p>
-        </p:txBody>
-      </p:sp>
-      <p:sp>
-        <p:nvSpPr>
-          <p:cNvPr id="20" name="Tekstvak 6">
-            <a:extLst>
-              <a:ext uri="{FF2B5EF4-FFF2-40B4-BE49-F238E27FC236}">
-                <a16:creationId xmlns:a16="http://schemas.microsoft.com/office/drawing/2014/main" id="{B19EE041-67B9-48B0-865B-A2D2BDE65B88}"/>
-              </a:ext>
-            </a:extLst>
-          </p:cNvPr>
-          <p:cNvSpPr txBox="1"/>
-          <p:nvPr/>
-        </p:nvSpPr>
-        <p:spPr>
-          <a:xfrm>
-            <a:off x="1827379" y="1596277"/>
-            <a:ext cx="1452997" cy="646331"/>
-          </a:xfrm>
-          <a:prstGeom prst="rect">
-            <a:avLst/>
-          </a:prstGeom>
-          <a:noFill/>
-        </p:spPr>
-        <p:txBody>
-          <a:bodyPr wrap="square" rtlCol="0">
-            <a:spAutoFit/>
-          </a:bodyPr>
-          <a:lstStyle/>
-          <a:p>
-            <a:r>
-              <a:rPr lang="nl-NL" dirty="0"/>
-              <a:t>Laten we H2 begroeten! </a:t>
-            </a:r>
-          </a:p>
-        </p:txBody>
-      </p:sp>
-      <p:cxnSp>
-        <p:nvCxnSpPr>
-          <p:cNvPr id="4" name="Straight Arrow Connector 3">
-            <a:extLst>
-              <a:ext uri="{FF2B5EF4-FFF2-40B4-BE49-F238E27FC236}">
-                <a16:creationId xmlns:a16="http://schemas.microsoft.com/office/drawing/2014/main" id="{0293E248-DFF3-4AFE-8F38-BBE60DDE2518}"/>
-              </a:ext>
-            </a:extLst>
-          </p:cNvPr>
-          <p:cNvCxnSpPr/>
-          <p:nvPr/>
-        </p:nvCxnSpPr>
-        <p:spPr>
-          <a:xfrm>
-            <a:off x="2661424" y="2824976"/>
-            <a:ext cx="683942" cy="0"/>
-          </a:xfrm>
-          <a:prstGeom prst="straightConnector1">
-            <a:avLst/>
-          </a:prstGeom>
-          <a:ln w="28575">
-            <a:solidFill>
-              <a:srgbClr val="FF0000"/>
-            </a:solidFill>
-            <a:tailEnd type="triangle"/>
-          </a:ln>
-        </p:spPr>
-        <p:style>
-          <a:lnRef idx="1">
-            <a:schemeClr val="accent1"/>
-          </a:lnRef>
-          <a:fillRef idx="0">
-            <a:schemeClr val="accent1"/>
-          </a:fillRef>
-          <a:effectRef idx="0">
-            <a:schemeClr val="accent1"/>
-          </a:effectRef>
-          <a:fontRef idx="minor">
-            <a:schemeClr val="tx1"/>
-          </a:fontRef>
-        </p:style>
-      </p:cxnSp>
-      <p:cxnSp>
-        <p:nvCxnSpPr>
-          <p:cNvPr id="21" name="Straight Arrow Connector 20">
-            <a:extLst>
-              <a:ext uri="{FF2B5EF4-FFF2-40B4-BE49-F238E27FC236}">
-                <a16:creationId xmlns:a16="http://schemas.microsoft.com/office/drawing/2014/main" id="{B9F94FE1-1085-4C02-904F-7121006B3408}"/>
-              </a:ext>
-            </a:extLst>
-          </p:cNvPr>
-          <p:cNvCxnSpPr/>
-          <p:nvPr/>
-        </p:nvCxnSpPr>
-        <p:spPr>
-          <a:xfrm>
-            <a:off x="4095681" y="2806391"/>
-            <a:ext cx="683942" cy="0"/>
-          </a:xfrm>
-          <a:prstGeom prst="straightConnector1">
-            <a:avLst/>
-          </a:prstGeom>
-          <a:ln w="28575">
-            <a:solidFill>
-              <a:srgbClr val="FF0000"/>
-            </a:solidFill>
-            <a:tailEnd type="triangle"/>
-          </a:ln>
-        </p:spPr>
-        <p:style>
-          <a:lnRef idx="1">
-            <a:schemeClr val="accent1"/>
-          </a:lnRef>
-          <a:fillRef idx="0">
-            <a:schemeClr val="accent1"/>
-          </a:fillRef>
-          <a:effectRef idx="0">
-            <a:schemeClr val="accent1"/>
-          </a:effectRef>
-          <a:fontRef idx="minor">
-            <a:schemeClr val="tx1"/>
-          </a:fontRef>
-        </p:style>
-      </p:cxnSp>
-      <p:cxnSp>
-        <p:nvCxnSpPr>
-          <p:cNvPr id="22" name="Straight Arrow Connector 21">
-            <a:extLst>
-              <a:ext uri="{FF2B5EF4-FFF2-40B4-BE49-F238E27FC236}">
-                <a16:creationId xmlns:a16="http://schemas.microsoft.com/office/drawing/2014/main" id="{51359DAA-5F73-4870-AD3D-11FB7A0F931C}"/>
-              </a:ext>
-            </a:extLst>
-          </p:cNvPr>
-          <p:cNvCxnSpPr/>
-          <p:nvPr/>
-        </p:nvCxnSpPr>
-        <p:spPr>
-          <a:xfrm>
-            <a:off x="5519853" y="2806391"/>
-            <a:ext cx="683942" cy="0"/>
-          </a:xfrm>
-          <a:prstGeom prst="straightConnector1">
-            <a:avLst/>
-          </a:prstGeom>
-          <a:ln w="28575">
-            <a:solidFill>
-              <a:srgbClr val="FF0000"/>
-            </a:solidFill>
-            <a:tailEnd type="triangle"/>
-          </a:ln>
-        </p:spPr>
-        <p:style>
-          <a:lnRef idx="1">
-            <a:schemeClr val="accent1"/>
-          </a:lnRef>
-          <a:fillRef idx="0">
-            <a:schemeClr val="accent1"/>
-          </a:fillRef>
-          <a:effectRef idx="0">
-            <a:schemeClr val="accent1"/>
-          </a:effectRef>
-          <a:fontRef idx="minor">
-            <a:schemeClr val="tx1"/>
-          </a:fontRef>
-        </p:style>
-      </p:cxnSp>
-      <p:cxnSp>
-        <p:nvCxnSpPr>
-          <p:cNvPr id="23" name="Straight Arrow Connector 22">
-            <a:extLst>
-              <a:ext uri="{FF2B5EF4-FFF2-40B4-BE49-F238E27FC236}">
-                <a16:creationId xmlns:a16="http://schemas.microsoft.com/office/drawing/2014/main" id="{A0AEB424-8125-4140-AA43-A9A2F421E4E4}"/>
-              </a:ext>
-            </a:extLst>
-          </p:cNvPr>
-          <p:cNvCxnSpPr>
-            <a:cxnSpLocks/>
-          </p:cNvCxnSpPr>
-          <p:nvPr/>
-        </p:nvCxnSpPr>
-        <p:spPr>
-          <a:xfrm>
-            <a:off x="5252224" y="3044283"/>
-            <a:ext cx="367991" cy="598449"/>
-          </a:xfrm>
-          <a:prstGeom prst="straightConnector1">
-            <a:avLst/>
-          </a:prstGeom>
-          <a:ln w="28575">
-            <a:solidFill>
-              <a:srgbClr val="FF0000"/>
-            </a:solidFill>
-            <a:tailEnd type="triangle"/>
-          </a:ln>
-        </p:spPr>
-        <p:style>
-          <a:lnRef idx="1">
-            <a:schemeClr val="accent1"/>
-          </a:lnRef>
-          <a:fillRef idx="0">
-            <a:schemeClr val="accent1"/>
-          </a:fillRef>
-          <a:effectRef idx="0">
-            <a:schemeClr val="accent1"/>
-          </a:effectRef>
-          <a:fontRef idx="minor">
-            <a:schemeClr val="tx1"/>
-          </a:fontRef>
-        </p:style>
-      </p:cxnSp>
-      <p:sp>
-        <p:nvSpPr>
-          <p:cNvPr id="25" name="Wolkvormige toelichting 14">
-            <a:extLst>
-              <a:ext uri="{FF2B5EF4-FFF2-40B4-BE49-F238E27FC236}">
-                <a16:creationId xmlns:a16="http://schemas.microsoft.com/office/drawing/2014/main" id="{59D8B84F-4A0F-497F-B1BF-B7E7AA38A93F}"/>
-              </a:ext>
-            </a:extLst>
-          </p:cNvPr>
-          <p:cNvSpPr/>
-          <p:nvPr/>
-        </p:nvSpPr>
-        <p:spPr>
-          <a:xfrm rot="765422">
-            <a:off x="4983882" y="937857"/>
-            <a:ext cx="2167417" cy="1316839"/>
-          </a:xfrm>
-          <a:prstGeom prst="cloudCallout">
-            <a:avLst>
-              <a:gd name="adj1" fmla="val -23621"/>
-              <a:gd name="adj2" fmla="val 70820"/>
-            </a:avLst>
-          </a:prstGeom>
-          <a:noFill/>
-          <a:ln w="12700">
-            <a:solidFill>
-              <a:schemeClr val="tx2">
-                <a:lumMod val="60000"/>
-                <a:lumOff val="40000"/>
-              </a:schemeClr>
-            </a:solidFill>
-          </a:ln>
-        </p:spPr>
-        <p:style>
-          <a:lnRef idx="1">
-            <a:schemeClr val="accent1"/>
-          </a:lnRef>
-          <a:fillRef idx="3">
-            <a:schemeClr val="accent1"/>
-          </a:fillRef>
-          <a:effectRef idx="2">
-            <a:schemeClr val="accent1"/>
-          </a:effectRef>
-          <a:fontRef idx="minor">
-            <a:schemeClr val="lt1"/>
-          </a:fontRef>
-        </p:style>
-        <p:txBody>
-          <a:bodyPr rtlCol="0" anchor="ctr"/>
-          <a:lstStyle/>
-          <a:p>
-            <a:pPr algn="ctr"/>
-            <a:endParaRPr lang="nl-NL"/>
-          </a:p>
-        </p:txBody>
-      </p:sp>
-      <p:sp>
-        <p:nvSpPr>
-          <p:cNvPr id="26" name="Tekstvak 15">
-            <a:extLst>
-              <a:ext uri="{FF2B5EF4-FFF2-40B4-BE49-F238E27FC236}">
-                <a16:creationId xmlns:a16="http://schemas.microsoft.com/office/drawing/2014/main" id="{FE8E510A-2615-4053-992A-513E7208287D}"/>
-              </a:ext>
-            </a:extLst>
-          </p:cNvPr>
-          <p:cNvSpPr txBox="1"/>
-          <p:nvPr/>
-        </p:nvSpPr>
-        <p:spPr>
-          <a:xfrm flipH="1">
-            <a:off x="5157913" y="1426999"/>
-            <a:ext cx="2112026" cy="338554"/>
-          </a:xfrm>
-          <a:prstGeom prst="rect">
-            <a:avLst/>
-          </a:prstGeom>
-          <a:noFill/>
-        </p:spPr>
-        <p:txBody>
-          <a:bodyPr wrap="square" rtlCol="0">
-            <a:spAutoFit/>
-          </a:bodyPr>
-          <a:lstStyle/>
-          <a:p>
-            <a:r>
-              <a:rPr lang="nl-NL" sz="1600" dirty="0"/>
-              <a:t>Ik ken H2 ook niet!</a:t>
-            </a:r>
-          </a:p>
-        </p:txBody>
-      </p:sp>
-      <p:sp>
-        <p:nvSpPr>
-          <p:cNvPr id="27" name="Wolkvormige toelichting 12">
-            <a:extLst>
-              <a:ext uri="{FF2B5EF4-FFF2-40B4-BE49-F238E27FC236}">
-                <a16:creationId xmlns:a16="http://schemas.microsoft.com/office/drawing/2014/main" id="{EFC1855E-DAA8-41E5-98B3-35A65FF5FA28}"/>
-              </a:ext>
-            </a:extLst>
-          </p:cNvPr>
-          <p:cNvSpPr/>
-          <p:nvPr/>
-        </p:nvSpPr>
-        <p:spPr>
-          <a:xfrm rot="10800000">
-            <a:off x="1827379" y="3237852"/>
-            <a:ext cx="2167417" cy="1316839"/>
-          </a:xfrm>
-          <a:prstGeom prst="cloudCallout">
-            <a:avLst>
-              <a:gd name="adj1" fmla="val -25627"/>
-              <a:gd name="adj2" fmla="val 67234"/>
-            </a:avLst>
-          </a:prstGeom>
-          <a:noFill/>
-          <a:ln w="12700">
-            <a:solidFill>
-              <a:schemeClr val="tx2">
-                <a:lumMod val="60000"/>
-                <a:lumOff val="40000"/>
-              </a:schemeClr>
-            </a:solidFill>
-          </a:ln>
-        </p:spPr>
-        <p:style>
-          <a:lnRef idx="1">
-            <a:schemeClr val="accent1"/>
-          </a:lnRef>
-          <a:fillRef idx="3">
-            <a:schemeClr val="accent1"/>
-          </a:fillRef>
-          <a:effectRef idx="2">
-            <a:schemeClr val="accent1"/>
-          </a:effectRef>
-          <a:fontRef idx="minor">
-            <a:schemeClr val="lt1"/>
-          </a:fontRef>
-        </p:style>
-        <p:txBody>
-          <a:bodyPr rtlCol="0" anchor="ctr"/>
-          <a:lstStyle/>
-          <a:p>
-            <a:pPr algn="ctr"/>
-            <a:endParaRPr lang="nl-NL"/>
-          </a:p>
-        </p:txBody>
-      </p:sp>
-      <p:sp>
-        <p:nvSpPr>
-          <p:cNvPr id="28" name="Tekstvak 13">
-            <a:extLst>
-              <a:ext uri="{FF2B5EF4-FFF2-40B4-BE49-F238E27FC236}">
-                <a16:creationId xmlns:a16="http://schemas.microsoft.com/office/drawing/2014/main" id="{045CAE2C-226A-4033-BF0A-9FB0887C06A4}"/>
-              </a:ext>
-            </a:extLst>
-          </p:cNvPr>
-          <p:cNvSpPr txBox="1"/>
-          <p:nvPr/>
-        </p:nvSpPr>
-        <p:spPr>
-          <a:xfrm>
-            <a:off x="2188856" y="3563900"/>
-            <a:ext cx="1712422" cy="738664"/>
-          </a:xfrm>
-          <a:prstGeom prst="rect">
-            <a:avLst/>
-          </a:prstGeom>
-          <a:noFill/>
-        </p:spPr>
-        <p:txBody>
-          <a:bodyPr wrap="square" rtlCol="0">
-            <a:spAutoFit/>
-          </a:bodyPr>
-          <a:lstStyle/>
-          <a:p>
-            <a:r>
-              <a:rPr lang="nl-NL" sz="1400" dirty="0"/>
-              <a:t>Ik ken H2 niet,</a:t>
-            </a:r>
-          </a:p>
-          <a:p>
-            <a:r>
-              <a:rPr lang="nl-NL" sz="1400" dirty="0"/>
-              <a:t>ik vraag het aan al m’n vrienden!</a:t>
-            </a:r>
-          </a:p>
-        </p:txBody>
-      </p:sp>
-    </p:spTree>
-    <p:extLst>
-      <p:ext uri="{BB962C8B-B14F-4D97-AF65-F5344CB8AC3E}">
-        <p14:creationId xmlns:p14="http://schemas.microsoft.com/office/powerpoint/2010/main" val="2725349193"/>
       </p:ext>
     </p:extLst>
   </p:cSld>

</xml_diff>

<commit_message>
small change to powerpoint
</commit_message>
<xml_diff>
--- a/Workshop Presentatie.pptx
+++ b/Workshop Presentatie.pptx
@@ -33,42 +33,42 @@
   <p:notesSz cx="6858000" cy="9144000"/>
   <p:embeddedFontLst>
     <p:embeddedFont>
-      <p:font typeface="KPN Sans Light" panose="020B0604020202020204" charset="0"/>
+      <p:font typeface="Calibri" panose="020F0502020204030204" pitchFamily="34" charset="0"/>
       <p:regular r:id="rId23"/>
-      <p:italic r:id="rId24"/>
+      <p:bold r:id="rId24"/>
+      <p:italic r:id="rId25"/>
+      <p:boldItalic r:id="rId26"/>
     </p:embeddedFont>
     <p:embeddedFont>
-      <p:font typeface="KPN Accent" panose="020B0604020202020204" charset="0"/>
-      <p:regular r:id="rId25"/>
-      <p:bold r:id="rId26"/>
-    </p:embeddedFont>
-    <p:embeddedFont>
-      <p:font typeface="Kokila" panose="020B0604020202020204" pitchFamily="34" charset="0"/>
+      <p:font typeface="KPN Sans" panose="020B0503040101020103" pitchFamily="34" charset="0"/>
       <p:regular r:id="rId27"/>
       <p:bold r:id="rId28"/>
       <p:italic r:id="rId29"/>
       <p:boldItalic r:id="rId30"/>
     </p:embeddedFont>
     <p:embeddedFont>
-      <p:font typeface="KPN Accent Light" panose="020B0604020202020204" charset="0"/>
+      <p:font typeface="KPN Sans Light" panose="020B0604020202020204" charset="0"/>
       <p:regular r:id="rId31"/>
+      <p:italic r:id="rId32"/>
     </p:embeddedFont>
     <p:embeddedFont>
-      <p:font typeface="Source Sans Pro" panose="020B0604020202020204" charset="0"/>
-      <p:regular r:id="rId32"/>
-      <p:bold r:id="rId33"/>
-      <p:italic r:id="rId34"/>
-      <p:boldItalic r:id="rId35"/>
+      <p:font typeface="KPN Accent Light" panose="020B0604020202020204" charset="0"/>
+      <p:regular r:id="rId33"/>
     </p:embeddedFont>
     <p:embeddedFont>
-      <p:font typeface="Calibri" panose="020F0502020204030204" pitchFamily="34" charset="0"/>
+      <p:font typeface="KPN Accent" panose="020B0604020202020204" charset="0"/>
+      <p:regular r:id="rId34"/>
+      <p:bold r:id="rId35"/>
+    </p:embeddedFont>
+    <p:embeddedFont>
+      <p:font typeface="Kokila" panose="020B0604020202020204" pitchFamily="34" charset="0"/>
       <p:regular r:id="rId36"/>
       <p:bold r:id="rId37"/>
       <p:italic r:id="rId38"/>
       <p:boldItalic r:id="rId39"/>
     </p:embeddedFont>
     <p:embeddedFont>
-      <p:font typeface="KPN Sans" panose="020B0503040101020103" pitchFamily="34" charset="0"/>
+      <p:font typeface="Source Sans Pro" panose="020B0604020202020204" charset="0"/>
       <p:regular r:id="rId40"/>
       <p:bold r:id="rId41"/>
       <p:italic r:id="rId42"/>
@@ -287,10 +287,6 @@
 </p:cmAuthorLst>
 </file>
 
-<file path=ppt/revisionInfo.xml><?xml version="1.0" encoding="utf-8"?>
-<p1510:revInfo xmlns:a="http://schemas.openxmlformats.org/drawingml/2006/main" xmlns:r="http://schemas.openxmlformats.org/officeDocument/2006/relationships" xmlns:p1510="http://schemas.microsoft.com/office/powerpoint/2015/10/main"/>
-</file>
-
 <file path=ppt/notesMasters/notesMaster1.xml><?xml version="1.0" encoding="utf-8"?>
 <p:notesMaster xmlns:a="http://schemas.openxmlformats.org/drawingml/2006/main" xmlns:r="http://schemas.openxmlformats.org/officeDocument/2006/relationships" xmlns:p="http://schemas.openxmlformats.org/presentationml/2006/main">
   <p:cSld>
@@ -378,7 +374,7 @@
             <a:fld id="{8C6F6815-A51B-4A22-9161-5FE7BFADE1A3}" type="datetimeFigureOut">
               <a:rPr lang="en-GB" smtClean="0"/>
               <a:pPr/>
-              <a:t>10/08/2018</a:t>
+              <a:t>27/08/2018</a:t>
             </a:fld>
             <a:endParaRPr lang="en-GB"/>
           </a:p>
@@ -18041,6 +18037,7 @@
             <a:r>
               <a:rPr lang="nl-NL" dirty="0">
                 <a:latin typeface="KPN Sans Light" panose="020B0604020202020204" charset="0"/>
+                <a:hlinkClick r:id="rId2"/>
               </a:rPr>
               <a:t>www.github.com/Marlou16/sdn-tutorial</a:t>
             </a:r>
@@ -18584,19 +18581,19 @@
               <a:rPr lang="en-US" dirty="0" err="1">
                 <a:latin typeface="KPN Sans Light" panose="020B0604020202020204" charset="0"/>
               </a:rPr>
-              <a:t>komt</a:t>
+              <a:t>houdt</a:t>
             </a:r>
             <a:r>
               <a:rPr lang="en-US" dirty="0">
                 <a:latin typeface="KPN Sans Light" panose="020B0604020202020204" charset="0"/>
               </a:rPr>
-              <a:t> door het </a:t>
+              <a:t> in </a:t>
             </a:r>
             <a:r>
               <a:rPr lang="en-US" dirty="0" err="1">
                 <a:latin typeface="KPN Sans Light" panose="020B0604020202020204" charset="0"/>
               </a:rPr>
-              <a:t>feit</a:t>
+              <a:t>dat</a:t>
             </a:r>
             <a:r>
               <a:rPr lang="en-US" dirty="0">
@@ -18608,7 +18605,19 @@
               <a:rPr lang="en-US" dirty="0" err="1">
                 <a:latin typeface="KPN Sans Light" panose="020B0604020202020204" charset="0"/>
               </a:rPr>
-              <a:t>dat</a:t>
+              <a:t>je</a:t>
+            </a:r>
+            <a:r>
+              <a:rPr lang="en-US" dirty="0">
+                <a:latin typeface="KPN Sans Light" panose="020B0604020202020204" charset="0"/>
+              </a:rPr>
+              <a:t> (</a:t>
+            </a:r>
+            <a:r>
+              <a:rPr lang="en-US" dirty="0" err="1">
+                <a:latin typeface="KPN Sans Light" panose="020B0604020202020204" charset="0"/>
+              </a:rPr>
+              <a:t>zelf</a:t>
             </a:r>
             <a:r>
               <a:rPr lang="en-US" dirty="0">
@@ -18620,13 +18629,13 @@
               <a:rPr lang="en-US" dirty="0" err="1">
                 <a:latin typeface="KPN Sans Light" panose="020B0604020202020204" charset="0"/>
               </a:rPr>
-              <a:t>je</a:t>
+              <a:t>geprogrammeerde</a:t>
             </a:r>
             <a:r>
               <a:rPr lang="en-US" dirty="0">
                 <a:latin typeface="KPN Sans Light" panose="020B0604020202020204" charset="0"/>
               </a:rPr>
-              <a:t> </a:t>
+              <a:t>) </a:t>
             </a:r>
             <a:r>
               <a:rPr lang="en-US" dirty="0" err="1">

</xml_diff>

<commit_message>
The presentation now also available in English, yey
</commit_message>
<xml_diff>
--- a/Workshop Presentatie.pptx
+++ b/Workshop Presentatie.pptx
@@ -33,51 +33,51 @@
   <p:notesSz cx="6858000" cy="9144000"/>
   <p:embeddedFontLst>
     <p:embeddedFont>
-      <p:font typeface="Calibri" panose="020F0502020204030204" pitchFamily="34" charset="0"/>
+      <p:font typeface="KPN Sans" panose="020B0503040101020103" pitchFamily="34" charset="0"/>
       <p:regular r:id="rId23"/>
       <p:bold r:id="rId24"/>
       <p:italic r:id="rId25"/>
       <p:boldItalic r:id="rId26"/>
     </p:embeddedFont>
     <p:embeddedFont>
-      <p:font typeface="KPN Sans" panose="020B0503040101020103" pitchFamily="34" charset="0"/>
+      <p:font typeface="KPN Accent" panose="020B0604020202020204" charset="0"/>
       <p:regular r:id="rId27"/>
       <p:bold r:id="rId28"/>
-      <p:italic r:id="rId29"/>
-      <p:boldItalic r:id="rId30"/>
+    </p:embeddedFont>
+    <p:embeddedFont>
+      <p:font typeface="Source Sans Pro" panose="020B0604020202020204" charset="0"/>
+      <p:regular r:id="rId29"/>
+      <p:bold r:id="rId30"/>
+      <p:italic r:id="rId31"/>
+      <p:boldItalic r:id="rId32"/>
     </p:embeddedFont>
     <p:embeddedFont>
       <p:font typeface="KPN Sans Light" panose="020B0604020202020204" charset="0"/>
-      <p:regular r:id="rId31"/>
-      <p:italic r:id="rId32"/>
+      <p:regular r:id="rId33"/>
+      <p:italic r:id="rId34"/>
+    </p:embeddedFont>
+    <p:embeddedFont>
+      <p:font typeface="Roboto Slab" panose="020B0604020202020204" charset="0"/>
+      <p:regular r:id="rId35"/>
+      <p:bold r:id="rId36"/>
+    </p:embeddedFont>
+    <p:embeddedFont>
+      <p:font typeface="Calibri" panose="020F0502020204030204" pitchFamily="34" charset="0"/>
+      <p:regular r:id="rId37"/>
+      <p:bold r:id="rId38"/>
+      <p:italic r:id="rId39"/>
+      <p:boldItalic r:id="rId40"/>
+    </p:embeddedFont>
+    <p:embeddedFont>
+      <p:font typeface="Kokila" panose="020B0604020202020204" pitchFamily="34" charset="0"/>
+      <p:regular r:id="rId41"/>
+      <p:bold r:id="rId42"/>
+      <p:italic r:id="rId43"/>
+      <p:boldItalic r:id="rId44"/>
     </p:embeddedFont>
     <p:embeddedFont>
       <p:font typeface="KPN Accent Light" panose="020B0604020202020204" charset="0"/>
-      <p:regular r:id="rId33"/>
-    </p:embeddedFont>
-    <p:embeddedFont>
-      <p:font typeface="KPN Accent" panose="020B0604020202020204" charset="0"/>
-      <p:regular r:id="rId34"/>
-      <p:bold r:id="rId35"/>
-    </p:embeddedFont>
-    <p:embeddedFont>
-      <p:font typeface="Kokila" panose="020B0604020202020204" pitchFamily="34" charset="0"/>
-      <p:regular r:id="rId36"/>
-      <p:bold r:id="rId37"/>
-      <p:italic r:id="rId38"/>
-      <p:boldItalic r:id="rId39"/>
-    </p:embeddedFont>
-    <p:embeddedFont>
-      <p:font typeface="Source Sans Pro" panose="020B0604020202020204" charset="0"/>
-      <p:regular r:id="rId40"/>
-      <p:bold r:id="rId41"/>
-      <p:italic r:id="rId42"/>
-      <p:boldItalic r:id="rId43"/>
-    </p:embeddedFont>
-    <p:embeddedFont>
-      <p:font typeface="Roboto Slab" panose="020B0604020202020204" charset="0"/>
-      <p:regular r:id="rId44"/>
-      <p:bold r:id="rId45"/>
+      <p:regular r:id="rId45"/>
     </p:embeddedFont>
   </p:embeddedFontLst>
   <p:defaultTextStyle>
@@ -374,7 +374,7 @@
             <a:fld id="{8C6F6815-A51B-4A22-9161-5FE7BFADE1A3}" type="datetimeFigureOut">
               <a:rPr lang="en-GB" smtClean="0"/>
               <a:pPr/>
-              <a:t>27/08/2018</a:t>
+              <a:t>13/09/2018</a:t>
             </a:fld>
             <a:endParaRPr lang="en-GB"/>
           </a:p>
@@ -16429,6 +16429,27 @@
             </a:endParaRPr>
           </a:p>
           <a:p>
+            <a:pPr lvl="1"/>
+            <a:r>
+              <a:rPr lang="nl-NL" dirty="0">
+                <a:latin typeface="KPN Sans Light" panose="020B0604020202020204" charset="0"/>
+              </a:rPr>
+              <a:t>(Even een </a:t>
+            </a:r>
+            <a:r>
+              <a:rPr lang="nl-NL">
+                <a:latin typeface="KPN Sans Light" panose="020B0604020202020204" charset="0"/>
+              </a:rPr>
+              <a:t>stukje Context (</a:t>
+            </a:r>
+            <a:r>
+              <a:rPr lang="nl-NL" dirty="0">
+                <a:latin typeface="KPN Sans Light" panose="020B0604020202020204" charset="0"/>
+              </a:rPr>
+              <a:t>alleen lezen))</a:t>
+            </a:r>
+          </a:p>
+          <a:p>
             <a:pPr marL="0" indent="0">
               <a:buNone/>
             </a:pPr>

</xml_diff>